<commit_message>
Added CITT content to README.
</commit_message>
<xml_diff>
--- a/presentations/03_functions.pptx
+++ b/presentations/03_functions.pptx
@@ -225,7 +225,7 @@
           <a:p>
             <a:fld id="{FD93C9B2-20F6-4DB1-B471-224337D0AC79}" type="datetimeFigureOut">
               <a:rPr lang="en-US" smtClean="0"/>
-              <a:t>10/11/2022</a:t>
+              <a:t>10/27/2022</a:t>
             </a:fld>
             <a:endParaRPr lang="en-US"/>
           </a:p>
@@ -3378,7 +3378,7 @@
           <a:p>
             <a:fld id="{C3F78080-8D0A-4BE8-A5B4-CB115102D524}" type="datetimeFigureOut">
               <a:rPr lang="en-US" smtClean="0"/>
-              <a:t>10/11/2022</a:t>
+              <a:t>10/27/2022</a:t>
             </a:fld>
             <a:endParaRPr lang="en-US"/>
           </a:p>
@@ -3576,7 +3576,7 @@
           <a:p>
             <a:fld id="{C3F78080-8D0A-4BE8-A5B4-CB115102D524}" type="datetimeFigureOut">
               <a:rPr lang="en-US" smtClean="0"/>
-              <a:t>10/11/2022</a:t>
+              <a:t>10/27/2022</a:t>
             </a:fld>
             <a:endParaRPr lang="en-US"/>
           </a:p>
@@ -3784,7 +3784,7 @@
           <a:p>
             <a:fld id="{C3F78080-8D0A-4BE8-A5B4-CB115102D524}" type="datetimeFigureOut">
               <a:rPr lang="en-US" smtClean="0"/>
-              <a:t>10/11/2022</a:t>
+              <a:t>10/27/2022</a:t>
             </a:fld>
             <a:endParaRPr lang="en-US"/>
           </a:p>
@@ -3982,7 +3982,7 @@
           <a:p>
             <a:fld id="{C3F78080-8D0A-4BE8-A5B4-CB115102D524}" type="datetimeFigureOut">
               <a:rPr lang="en-US" smtClean="0"/>
-              <a:t>10/11/2022</a:t>
+              <a:t>10/27/2022</a:t>
             </a:fld>
             <a:endParaRPr lang="en-US"/>
           </a:p>
@@ -4257,7 +4257,7 @@
           <a:p>
             <a:fld id="{C3F78080-8D0A-4BE8-A5B4-CB115102D524}" type="datetimeFigureOut">
               <a:rPr lang="en-US" smtClean="0"/>
-              <a:t>10/11/2022</a:t>
+              <a:t>10/27/2022</a:t>
             </a:fld>
             <a:endParaRPr lang="en-US"/>
           </a:p>
@@ -4522,7 +4522,7 @@
           <a:p>
             <a:fld id="{C3F78080-8D0A-4BE8-A5B4-CB115102D524}" type="datetimeFigureOut">
               <a:rPr lang="en-US" smtClean="0"/>
-              <a:t>10/11/2022</a:t>
+              <a:t>10/27/2022</a:t>
             </a:fld>
             <a:endParaRPr lang="en-US"/>
           </a:p>
@@ -4934,7 +4934,7 @@
           <a:p>
             <a:fld id="{C3F78080-8D0A-4BE8-A5B4-CB115102D524}" type="datetimeFigureOut">
               <a:rPr lang="en-US" smtClean="0"/>
-              <a:t>10/11/2022</a:t>
+              <a:t>10/27/2022</a:t>
             </a:fld>
             <a:endParaRPr lang="en-US"/>
           </a:p>
@@ -5075,7 +5075,7 @@
           <a:p>
             <a:fld id="{C3F78080-8D0A-4BE8-A5B4-CB115102D524}" type="datetimeFigureOut">
               <a:rPr lang="en-US" smtClean="0"/>
-              <a:t>10/11/2022</a:t>
+              <a:t>10/27/2022</a:t>
             </a:fld>
             <a:endParaRPr lang="en-US"/>
           </a:p>
@@ -5188,7 +5188,7 @@
           <a:p>
             <a:fld id="{C3F78080-8D0A-4BE8-A5B4-CB115102D524}" type="datetimeFigureOut">
               <a:rPr lang="en-US" smtClean="0"/>
-              <a:t>10/11/2022</a:t>
+              <a:t>10/27/2022</a:t>
             </a:fld>
             <a:endParaRPr lang="en-US"/>
           </a:p>
@@ -5499,7 +5499,7 @@
           <a:p>
             <a:fld id="{C3F78080-8D0A-4BE8-A5B4-CB115102D524}" type="datetimeFigureOut">
               <a:rPr lang="en-US" smtClean="0"/>
-              <a:t>10/11/2022</a:t>
+              <a:t>10/27/2022</a:t>
             </a:fld>
             <a:endParaRPr lang="en-US"/>
           </a:p>
@@ -5787,7 +5787,7 @@
           <a:p>
             <a:fld id="{C3F78080-8D0A-4BE8-A5B4-CB115102D524}" type="datetimeFigureOut">
               <a:rPr lang="en-US" smtClean="0"/>
-              <a:t>10/11/2022</a:t>
+              <a:t>10/27/2022</a:t>
             </a:fld>
             <a:endParaRPr lang="en-US"/>
           </a:p>
@@ -6028,7 +6028,7 @@
           <a:p>
             <a:fld id="{C3F78080-8D0A-4BE8-A5B4-CB115102D524}" type="datetimeFigureOut">
               <a:rPr lang="en-US" smtClean="0"/>
-              <a:t>10/11/2022</a:t>
+              <a:t>10/27/2022</a:t>
             </a:fld>
             <a:endParaRPr lang="en-US"/>
           </a:p>
@@ -6685,8 +6685,8 @@
         </p:nvSpPr>
         <p:spPr>
           <a:xfrm>
-            <a:off x="2236945" y="2507100"/>
-            <a:ext cx="7718108" cy="2308324"/>
+            <a:off x="2236945" y="2322434"/>
+            <a:ext cx="7718108" cy="2677656"/>
           </a:xfrm>
           <a:prstGeom prst="rect">
             <a:avLst/>
@@ -6713,16 +6713,25 @@
             <a:r>
               <a:rPr lang="en-US" sz="2400" dirty="0">
                 <a:solidFill>
+                  <a:srgbClr val="007C00"/>
+                </a:solidFill>
+                <a:latin typeface="Consolas" panose="020B0609020204030204" pitchFamily="49" charset="0"/>
+              </a:rPr>
+              <a:t>def</a:t>
+            </a:r>
+            <a:r>
+              <a:rPr lang="en-US" sz="2400" dirty="0">
+                <a:solidFill>
                   <a:srgbClr val="FF00FF"/>
                 </a:solidFill>
                 <a:latin typeface="Consolas" panose="020B0609020204030204" pitchFamily="49" charset="0"/>
               </a:rPr>
-              <a:t>def </a:t>
+              <a:t> </a:t>
             </a:r>
             <a:r>
               <a:rPr lang="en-US" sz="2400" dirty="0">
                 <a:solidFill>
-                  <a:srgbClr val="00B0F0"/>
+                  <a:srgbClr val="482DFF"/>
                 </a:solidFill>
                 <a:latin typeface="Consolas" panose="020B0609020204030204" pitchFamily="49" charset="0"/>
               </a:rPr>
@@ -6745,7 +6754,7 @@
             <a:r>
               <a:rPr lang="en-US" sz="2400" dirty="0">
                 <a:solidFill>
-                  <a:srgbClr val="FFC000"/>
+                  <a:srgbClr val="007C00"/>
                 </a:solidFill>
                 <a:latin typeface="Consolas" panose="020B0609020204030204" pitchFamily="49" charset="0"/>
               </a:rPr>
@@ -6760,7 +6769,7 @@
             <a:r>
               <a:rPr lang="en-US" sz="2400" dirty="0">
                 <a:solidFill>
-                  <a:srgbClr val="92D050"/>
+                  <a:srgbClr val="BA2020"/>
                 </a:solidFill>
                 <a:latin typeface="Consolas" panose="020B0609020204030204" pitchFamily="49" charset="0"/>
               </a:rPr>
@@ -6776,52 +6785,48 @@
           <a:p>
             <a:r>
               <a:rPr lang="en-US" sz="2400" dirty="0">
+                <a:solidFill>
+                  <a:srgbClr val="007C00"/>
+                </a:solidFill>
                 <a:latin typeface="Consolas" panose="020B0609020204030204" pitchFamily="49" charset="0"/>
               </a:rPr>
-              <a:t>	</a:t>
-            </a:r>
-            <a:r>
-              <a:rPr lang="en-US" sz="2400" dirty="0">
-                <a:solidFill>
-                  <a:srgbClr val="FF00FF"/>
-                </a:solidFill>
-                <a:latin typeface="Consolas" panose="020B0609020204030204" pitchFamily="49" charset="0"/>
-              </a:rPr>
-              <a:t>return</a:t>
-            </a:r>
+              <a:t>	return True</a:t>
+            </a:r>
+          </a:p>
+          <a:p>
+            <a:endParaRPr lang="en-US" sz="2400" dirty="0">
+              <a:solidFill>
+                <a:srgbClr val="007C00"/>
+              </a:solidFill>
+              <a:latin typeface="Consolas" panose="020B0609020204030204" pitchFamily="49" charset="0"/>
+            </a:endParaRPr>
+          </a:p>
+          <a:p>
             <a:r>
               <a:rPr lang="en-US" sz="2400" dirty="0">
                 <a:latin typeface="Consolas" panose="020B0609020204030204" pitchFamily="49" charset="0"/>
               </a:rPr>
-              <a:t> </a:t>
+              <a:t>myName </a:t>
             </a:r>
             <a:r>
               <a:rPr lang="en-US" sz="2400" dirty="0">
                 <a:solidFill>
-                  <a:srgbClr val="FFC000"/>
+                  <a:srgbClr val="BD62FF"/>
                 </a:solidFill>
                 <a:latin typeface="Consolas" panose="020B0609020204030204" pitchFamily="49" charset="0"/>
               </a:rPr>
-              <a:t>True</a:t>
-            </a:r>
-          </a:p>
-          <a:p>
-            <a:r>
-              <a:rPr lang="en-US" sz="2400" dirty="0" err="1">
-                <a:latin typeface="Consolas" panose="020B0609020204030204" pitchFamily="49" charset="0"/>
-              </a:rPr>
-              <a:t>myName</a:t>
+              <a:t>=</a:t>
             </a:r>
             <a:r>
               <a:rPr lang="en-US" sz="2400" dirty="0">
                 <a:latin typeface="Consolas" panose="020B0609020204030204" pitchFamily="49" charset="0"/>
               </a:rPr>
-              <a:t> = </a:t>
+              <a:t> </a:t>
             </a:r>
             <a:r>
               <a:rPr lang="en-US" sz="2400" dirty="0">
                 <a:solidFill>
-                  <a:srgbClr val="FFC000"/>
+                  <a:srgbClr val="007C00"/>
                 </a:solidFill>
                 <a:latin typeface="Consolas" panose="020B0609020204030204" pitchFamily="49" charset="0"/>
               </a:rPr>
@@ -6848,32 +6853,38 @@
                 </a:solidFill>
                 <a:latin typeface="Consolas" panose="020B0609020204030204" pitchFamily="49" charset="0"/>
               </a:rPr>
-              <a:t> = hello</a:t>
+              <a:t> </a:t>
+            </a:r>
+            <a:r>
+              <a:rPr lang="en-US" sz="2400" dirty="0">
+                <a:solidFill>
+                  <a:srgbClr val="BD62FF"/>
+                </a:solidFill>
+                <a:latin typeface="Consolas" panose="020B0609020204030204" pitchFamily="49" charset="0"/>
+              </a:rPr>
+              <a:t>=</a:t>
+            </a:r>
+            <a:r>
+              <a:rPr lang="en-US" sz="2400" dirty="0">
+                <a:solidFill>
+                  <a:srgbClr val="FFC000"/>
+                </a:solidFill>
+                <a:latin typeface="Consolas" panose="020B0609020204030204" pitchFamily="49" charset="0"/>
+              </a:rPr>
+              <a:t> </a:t>
             </a:r>
             <a:r>
               <a:rPr lang="en-US" sz="2400" dirty="0">
                 <a:latin typeface="Consolas" panose="020B0609020204030204" pitchFamily="49" charset="0"/>
               </a:rPr>
-              <a:t>(</a:t>
-            </a:r>
-            <a:r>
-              <a:rPr lang="en-US" sz="2400" dirty="0" err="1">
-                <a:latin typeface="Consolas" panose="020B0609020204030204" pitchFamily="49" charset="0"/>
-              </a:rPr>
-              <a:t>myName</a:t>
-            </a:r>
+              <a:t>hello(myName)</a:t>
+            </a:r>
+          </a:p>
+          <a:p>
             <a:r>
               <a:rPr lang="en-US" sz="2400" dirty="0">
-                <a:latin typeface="Consolas" panose="020B0609020204030204" pitchFamily="49" charset="0"/>
-              </a:rPr>
-              <a:t>)</a:t>
-            </a:r>
-          </a:p>
-          <a:p>
-            <a:r>
-              <a:rPr lang="en-US" sz="2400" dirty="0">
-                <a:solidFill>
-                  <a:srgbClr val="FFC000"/>
+                <a:solidFill>
+                  <a:srgbClr val="007C00"/>
                 </a:solidFill>
                 <a:latin typeface="Consolas" panose="020B0609020204030204" pitchFamily="49" charset="0"/>
               </a:rPr>
@@ -7166,16 +7177,25 @@
             <a:r>
               <a:rPr lang="en-US" sz="2400" dirty="0">
                 <a:solidFill>
+                  <a:srgbClr val="007C00"/>
+                </a:solidFill>
+                <a:latin typeface="Consolas" panose="020B0609020204030204" pitchFamily="49" charset="0"/>
+              </a:rPr>
+              <a:t>def</a:t>
+            </a:r>
+            <a:r>
+              <a:rPr lang="en-US" sz="2400" dirty="0">
+                <a:solidFill>
                   <a:srgbClr val="FF00FF"/>
                 </a:solidFill>
                 <a:latin typeface="Consolas" panose="020B0609020204030204" pitchFamily="49" charset="0"/>
               </a:rPr>
-              <a:t>def </a:t>
+              <a:t> </a:t>
             </a:r>
             <a:r>
               <a:rPr lang="en-US" sz="2400" dirty="0">
                 <a:solidFill>
-                  <a:srgbClr val="3366FF"/>
+                  <a:srgbClr val="482DFF"/>
                 </a:solidFill>
                 <a:latin typeface="Consolas" panose="020B0609020204030204" pitchFamily="49" charset="0"/>
               </a:rPr>
@@ -7198,7 +7218,7 @@
             <a:r>
               <a:rPr lang="en-US" sz="2400" dirty="0">
                 <a:solidFill>
-                  <a:srgbClr val="FFC000"/>
+                  <a:srgbClr val="007C00"/>
                 </a:solidFill>
                 <a:latin typeface="Consolas" panose="020B0609020204030204" pitchFamily="49" charset="0"/>
               </a:rPr>
@@ -7213,7 +7233,7 @@
             <a:r>
               <a:rPr lang="en-US" sz="2400" dirty="0">
                 <a:solidFill>
-                  <a:srgbClr val="5EBB78"/>
+                  <a:srgbClr val="BA2020"/>
                 </a:solidFill>
                 <a:latin typeface="Consolas" panose="020B0609020204030204" pitchFamily="49" charset="0"/>
               </a:rPr>
@@ -7223,7 +7243,22 @@
               <a:rPr lang="en-US" sz="2400" dirty="0">
                 <a:latin typeface="Consolas" panose="020B0609020204030204" pitchFamily="49" charset="0"/>
               </a:rPr>
-              <a:t>.format(name))</a:t>
+              <a:t>.</a:t>
+            </a:r>
+            <a:r>
+              <a:rPr lang="en-US" sz="2400" dirty="0">
+                <a:solidFill>
+                  <a:srgbClr val="4D5EB6"/>
+                </a:solidFill>
+                <a:latin typeface="Consolas" panose="020B0609020204030204" pitchFamily="49" charset="0"/>
+              </a:rPr>
+              <a:t>format</a:t>
+            </a:r>
+            <a:r>
+              <a:rPr lang="en-US" sz="2400" dirty="0">
+                <a:latin typeface="Consolas" panose="020B0609020204030204" pitchFamily="49" charset="0"/>
+              </a:rPr>
+              <a:t>(name))</a:t>
             </a:r>
           </a:p>
           <a:p>
@@ -7233,31 +7268,55 @@
           </a:p>
           <a:p>
             <a:r>
-              <a:rPr lang="en-US" sz="2400" dirty="0" err="1">
-                <a:latin typeface="Consolas" panose="020B0609020204030204" pitchFamily="49" charset="0"/>
-              </a:rPr>
-              <a:t>myName</a:t>
-            </a:r>
-            <a:r>
               <a:rPr lang="en-US" sz="2400" dirty="0">
                 <a:latin typeface="Consolas" panose="020B0609020204030204" pitchFamily="49" charset="0"/>
               </a:rPr>
-              <a:t> = </a:t>
+              <a:t>myName </a:t>
             </a:r>
             <a:r>
               <a:rPr lang="en-US" sz="2400" dirty="0">
                 <a:solidFill>
-                  <a:srgbClr val="FFC000"/>
+                  <a:srgbClr val="BD62FF"/>
                 </a:solidFill>
                 <a:latin typeface="Consolas" panose="020B0609020204030204" pitchFamily="49" charset="0"/>
               </a:rPr>
-              <a:t>input</a:t>
+              <a:t>=</a:t>
             </a:r>
             <a:r>
               <a:rPr lang="en-US" sz="2400" dirty="0">
                 <a:latin typeface="Consolas" panose="020B0609020204030204" pitchFamily="49" charset="0"/>
               </a:rPr>
-              <a:t>('Name? ‘)</a:t>
+              <a:t> </a:t>
+            </a:r>
+            <a:r>
+              <a:rPr lang="en-US" sz="2400" dirty="0">
+                <a:solidFill>
+                  <a:srgbClr val="007C00"/>
+                </a:solidFill>
+                <a:latin typeface="Consolas" panose="020B0609020204030204" pitchFamily="49" charset="0"/>
+              </a:rPr>
+              <a:t>input</a:t>
+            </a:r>
+            <a:r>
+              <a:rPr lang="en-US" sz="2400" dirty="0">
+                <a:latin typeface="Consolas" panose="020B0609020204030204" pitchFamily="49" charset="0"/>
+              </a:rPr>
+              <a:t>(</a:t>
+            </a:r>
+            <a:r>
+              <a:rPr lang="en-US" sz="2400" dirty="0">
+                <a:solidFill>
+                  <a:srgbClr val="BA2020"/>
+                </a:solidFill>
+                <a:latin typeface="Consolas" panose="020B0609020204030204" pitchFamily="49" charset="0"/>
+              </a:rPr>
+              <a:t>'Name? '</a:t>
+            </a:r>
+            <a:r>
+              <a:rPr lang="en-US" sz="2400" dirty="0">
+                <a:latin typeface="Consolas" panose="020B0609020204030204" pitchFamily="49" charset="0"/>
+              </a:rPr>
+              <a:t>)</a:t>
             </a:r>
           </a:p>
           <a:p>
@@ -7272,7 +7331,7 @@
             <a:r>
               <a:rPr lang="en-US" sz="2400" dirty="0">
                 <a:solidFill>
-                  <a:srgbClr val="5EBB78"/>
+                  <a:srgbClr val="698F91"/>
                 </a:solidFill>
                 <a:latin typeface="Consolas" panose="020B0609020204030204" pitchFamily="49" charset="0"/>
               </a:rPr>
@@ -7280,32 +7339,11 @@
             </a:r>
           </a:p>
           <a:p>
-            <a:r>
-              <a:rPr lang="en-US" sz="2400" dirty="0">
-                <a:solidFill>
-                  <a:srgbClr val="3366FF"/>
-                </a:solidFill>
-                <a:latin typeface="Consolas" panose="020B0609020204030204" pitchFamily="49" charset="0"/>
-              </a:rPr>
-              <a:t>hello</a:t>
-            </a:r>
             <a:r>
               <a:rPr lang="en-US" sz="2400" dirty="0">
                 <a:latin typeface="Consolas" panose="020B0609020204030204" pitchFamily="49" charset="0"/>
               </a:rPr>
-              <a:t>(</a:t>
-            </a:r>
-            <a:r>
-              <a:rPr lang="en-US" sz="2400" dirty="0" err="1">
-                <a:latin typeface="Consolas" panose="020B0609020204030204" pitchFamily="49" charset="0"/>
-              </a:rPr>
-              <a:t>myName</a:t>
-            </a:r>
-            <a:r>
-              <a:rPr lang="en-US" sz="2400" dirty="0">
-                <a:latin typeface="Consolas" panose="020B0609020204030204" pitchFamily="49" charset="0"/>
-              </a:rPr>
-              <a:t>)</a:t>
+              <a:t>hello(myName)</a:t>
             </a:r>
           </a:p>
           <a:p>
@@ -7317,7 +7355,7 @@
             <a:r>
               <a:rPr lang="en-US" sz="2400" dirty="0">
                 <a:solidFill>
-                  <a:srgbClr val="5EBB78"/>
+                  <a:srgbClr val="698F91"/>
                 </a:solidFill>
                 <a:latin typeface="Consolas" panose="020B0609020204030204" pitchFamily="49" charset="0"/>
               </a:rPr>
@@ -7325,32 +7363,26 @@
             </a:r>
           </a:p>
           <a:p>
-            <a:r>
-              <a:rPr lang="en-US" sz="2400" dirty="0">
-                <a:solidFill>
-                  <a:srgbClr val="3366FF"/>
-                </a:solidFill>
-                <a:latin typeface="Consolas" panose="020B0609020204030204" pitchFamily="49" charset="0"/>
-              </a:rPr>
-              <a:t>hello</a:t>
-            </a:r>
             <a:r>
               <a:rPr lang="en-US" sz="2400" dirty="0">
                 <a:latin typeface="Consolas" panose="020B0609020204030204" pitchFamily="49" charset="0"/>
               </a:rPr>
-              <a:t>(name = </a:t>
-            </a:r>
-            <a:r>
-              <a:rPr lang="en-US" sz="2400" dirty="0" err="1">
+              <a:t>hello(name </a:t>
+            </a:r>
+            <a:r>
+              <a:rPr lang="en-US" sz="2400" dirty="0">
+                <a:solidFill>
+                  <a:srgbClr val="BD62FF"/>
+                </a:solidFill>
                 <a:latin typeface="Consolas" panose="020B0609020204030204" pitchFamily="49" charset="0"/>
               </a:rPr>
-              <a:t>myName</a:t>
+              <a:t>=</a:t>
             </a:r>
             <a:r>
               <a:rPr lang="en-US" sz="2400" dirty="0">
                 <a:latin typeface="Consolas" panose="020B0609020204030204" pitchFamily="49" charset="0"/>
               </a:rPr>
-              <a:t>)</a:t>
+              <a:t> myName)</a:t>
             </a:r>
           </a:p>
         </p:txBody>
@@ -9853,7 +9885,7 @@
         </p:nvSpPr>
         <p:spPr>
           <a:xfrm>
-            <a:off x="3454855" y="4127603"/>
+            <a:off x="3454855" y="3867038"/>
             <a:ext cx="6098720" cy="954107"/>
           </a:xfrm>
           <a:prstGeom prst="rect">
@@ -9881,16 +9913,25 @@
             <a:r>
               <a:rPr lang="en-US" sz="2800" dirty="0">
                 <a:solidFill>
+                  <a:srgbClr val="007C00"/>
+                </a:solidFill>
+                <a:latin typeface="Consolas" panose="020B0609020204030204" pitchFamily="49" charset="0"/>
+              </a:rPr>
+              <a:t>def</a:t>
+            </a:r>
+            <a:r>
+              <a:rPr lang="en-US" sz="2800" dirty="0">
+                <a:solidFill>
                   <a:srgbClr val="FF00FF"/>
                 </a:solidFill>
                 <a:latin typeface="Consolas" panose="020B0609020204030204" pitchFamily="49" charset="0"/>
               </a:rPr>
-              <a:t>def </a:t>
+              <a:t> </a:t>
             </a:r>
             <a:r>
               <a:rPr lang="en-US" sz="2800" dirty="0">
                 <a:solidFill>
-                  <a:srgbClr val="00B0F0"/>
+                  <a:srgbClr val="482DFF"/>
                 </a:solidFill>
                 <a:latin typeface="Consolas" panose="020B0609020204030204" pitchFamily="49" charset="0"/>
               </a:rPr>
@@ -9908,12 +9949,27 @@
               <a:rPr lang="en-US" sz="2800" dirty="0">
                 <a:latin typeface="Consolas" panose="020B0609020204030204" pitchFamily="49" charset="0"/>
               </a:rPr>
-              <a:t>    print(</a:t>
+              <a:t>    </a:t>
             </a:r>
             <a:r>
               <a:rPr lang="en-US" sz="2800" dirty="0">
                 <a:solidFill>
-                  <a:srgbClr val="5EBB78"/>
+                  <a:srgbClr val="007C00"/>
+                </a:solidFill>
+                <a:latin typeface="Consolas" panose="020B0609020204030204" pitchFamily="49" charset="0"/>
+              </a:rPr>
+              <a:t>print</a:t>
+            </a:r>
+            <a:r>
+              <a:rPr lang="en-US" sz="2800" dirty="0">
+                <a:latin typeface="Consolas" panose="020B0609020204030204" pitchFamily="49" charset="0"/>
+              </a:rPr>
+              <a:t>(</a:t>
+            </a:r>
+            <a:r>
+              <a:rPr lang="en-US" sz="2800" dirty="0">
+                <a:solidFill>
+                  <a:srgbClr val="BA2020"/>
                 </a:solidFill>
                 <a:latin typeface="Consolas" panose="020B0609020204030204" pitchFamily="49" charset="0"/>
               </a:rPr>
@@ -10415,16 +10471,25 @@
             <a:r>
               <a:rPr lang="en-US" sz="2800" dirty="0">
                 <a:solidFill>
+                  <a:srgbClr val="007C00"/>
+                </a:solidFill>
+                <a:latin typeface="Consolas" panose="020B0609020204030204" pitchFamily="49" charset="0"/>
+              </a:rPr>
+              <a:t>def</a:t>
+            </a:r>
+            <a:r>
+              <a:rPr lang="en-US" sz="2800" dirty="0">
+                <a:solidFill>
                   <a:srgbClr val="FF00FF"/>
                 </a:solidFill>
                 <a:latin typeface="Consolas" panose="020B0609020204030204" pitchFamily="49" charset="0"/>
               </a:rPr>
-              <a:t>def </a:t>
+              <a:t> </a:t>
             </a:r>
             <a:r>
               <a:rPr lang="en-US" sz="2800" dirty="0">
                 <a:solidFill>
-                  <a:srgbClr val="00B0F0"/>
+                  <a:srgbClr val="482DFF"/>
                 </a:solidFill>
                 <a:latin typeface="Consolas" panose="020B0609020204030204" pitchFamily="49" charset="0"/>
               </a:rPr>
@@ -10442,12 +10507,27 @@
               <a:rPr lang="en-US" sz="2800" dirty="0">
                 <a:latin typeface="Consolas" panose="020B0609020204030204" pitchFamily="49" charset="0"/>
               </a:rPr>
-              <a:t>    print(</a:t>
+              <a:t>    </a:t>
             </a:r>
             <a:r>
               <a:rPr lang="en-US" sz="2800" dirty="0">
                 <a:solidFill>
-                  <a:srgbClr val="5EBB78"/>
+                  <a:srgbClr val="007C00"/>
+                </a:solidFill>
+                <a:latin typeface="Consolas" panose="020B0609020204030204" pitchFamily="49" charset="0"/>
+              </a:rPr>
+              <a:t>print</a:t>
+            </a:r>
+            <a:r>
+              <a:rPr lang="en-US" sz="2800" dirty="0">
+                <a:latin typeface="Consolas" panose="020B0609020204030204" pitchFamily="49" charset="0"/>
+              </a:rPr>
+              <a:t>(</a:t>
+            </a:r>
+            <a:r>
+              <a:rPr lang="en-US" sz="2800" dirty="0">
+                <a:solidFill>
+                  <a:srgbClr val="C00000"/>
                 </a:solidFill>
                 <a:latin typeface="Consolas" panose="020B0609020204030204" pitchFamily="49" charset="0"/>
               </a:rPr>
@@ -10951,16 +11031,25 @@
             <a:r>
               <a:rPr lang="en-US" sz="2800" dirty="0">
                 <a:solidFill>
+                  <a:srgbClr val="007C00"/>
+                </a:solidFill>
+                <a:latin typeface="Consolas" panose="020B0609020204030204" pitchFamily="49" charset="0"/>
+              </a:rPr>
+              <a:t>def</a:t>
+            </a:r>
+            <a:r>
+              <a:rPr lang="en-US" sz="2800" dirty="0">
+                <a:solidFill>
                   <a:srgbClr val="FF00FF"/>
                 </a:solidFill>
                 <a:latin typeface="Consolas" panose="020B0609020204030204" pitchFamily="49" charset="0"/>
               </a:rPr>
-              <a:t>def </a:t>
+              <a:t> </a:t>
             </a:r>
             <a:r>
               <a:rPr lang="en-US" sz="2800" dirty="0">
                 <a:solidFill>
-                  <a:srgbClr val="00B0F0"/>
+                  <a:srgbClr val="482DFF"/>
                 </a:solidFill>
                 <a:latin typeface="Consolas" panose="020B0609020204030204" pitchFamily="49" charset="0"/>
               </a:rPr>
@@ -10983,7 +11072,7 @@
             <a:r>
               <a:rPr lang="en-US" sz="2800" dirty="0">
                 <a:solidFill>
-                  <a:srgbClr val="FFC000"/>
+                  <a:srgbClr val="007C00"/>
                 </a:solidFill>
                 <a:latin typeface="Consolas" panose="020B0609020204030204" pitchFamily="49" charset="0"/>
               </a:rPr>
@@ -10998,7 +11087,7 @@
             <a:r>
               <a:rPr lang="en-US" sz="2800" dirty="0">
                 <a:solidFill>
-                  <a:srgbClr val="5EBB78"/>
+                  <a:srgbClr val="BA2020"/>
                 </a:solidFill>
                 <a:latin typeface="Consolas" panose="020B0609020204030204" pitchFamily="49" charset="0"/>
               </a:rPr>
@@ -11008,7 +11097,22 @@
               <a:rPr lang="en-US" sz="2800" dirty="0">
                 <a:latin typeface="Consolas" panose="020B0609020204030204" pitchFamily="49" charset="0"/>
               </a:rPr>
-              <a:t>.format(name))</a:t>
+              <a:t>.</a:t>
+            </a:r>
+            <a:r>
+              <a:rPr lang="en-US" sz="2800" dirty="0">
+                <a:solidFill>
+                  <a:srgbClr val="4D5EB6"/>
+                </a:solidFill>
+                <a:latin typeface="Consolas" panose="020B0609020204030204" pitchFamily="49" charset="0"/>
+              </a:rPr>
+              <a:t>format</a:t>
+            </a:r>
+            <a:r>
+              <a:rPr lang="en-US" sz="2800" dirty="0">
+                <a:latin typeface="Consolas" panose="020B0609020204030204" pitchFamily="49" charset="0"/>
+              </a:rPr>
+              <a:t>(name))</a:t>
             </a:r>
           </a:p>
           <a:p>
@@ -11018,42 +11122,34 @@
           </a:p>
           <a:p>
             <a:r>
-              <a:rPr lang="en-US" sz="2800" dirty="0" err="1">
-                <a:latin typeface="Consolas" panose="020B0609020204030204" pitchFamily="49" charset="0"/>
-              </a:rPr>
-              <a:t>myName</a:t>
-            </a:r>
-            <a:r>
               <a:rPr lang="en-US" sz="2800" dirty="0">
                 <a:latin typeface="Consolas" panose="020B0609020204030204" pitchFamily="49" charset="0"/>
               </a:rPr>
-              <a:t> = </a:t>
+              <a:t>myName </a:t>
             </a:r>
             <a:r>
               <a:rPr lang="en-US" sz="2800" dirty="0">
                 <a:solidFill>
-                  <a:srgbClr val="FFC000"/>
+                  <a:srgbClr val="BD62FF"/>
                 </a:solidFill>
                 <a:latin typeface="Consolas" panose="020B0609020204030204" pitchFamily="49" charset="0"/>
               </a:rPr>
-              <a:t>input</a:t>
+              <a:t>=</a:t>
             </a:r>
             <a:r>
               <a:rPr lang="en-US" sz="2800" dirty="0">
                 <a:latin typeface="Consolas" panose="020B0609020204030204" pitchFamily="49" charset="0"/>
               </a:rPr>
-              <a:t>('Name? ')</a:t>
-            </a:r>
-          </a:p>
-          <a:p>
+              <a:t> </a:t>
+            </a:r>
             <a:r>
               <a:rPr lang="en-US" sz="2800" dirty="0">
                 <a:solidFill>
-                  <a:srgbClr val="FFC000"/>
+                  <a:srgbClr val="007C00"/>
                 </a:solidFill>
                 <a:latin typeface="Consolas" panose="020B0609020204030204" pitchFamily="49" charset="0"/>
               </a:rPr>
-              <a:t>hello</a:t>
+              <a:t>input</a:t>
             </a:r>
             <a:r>
               <a:rPr lang="en-US" sz="2800" dirty="0">
@@ -11062,16 +11158,27 @@
               <a:t>(</a:t>
             </a:r>
             <a:r>
-              <a:rPr lang="en-US" sz="2800" dirty="0" err="1">
+              <a:rPr lang="en-US" sz="2800" dirty="0">
+                <a:solidFill>
+                  <a:srgbClr val="BA2020"/>
+                </a:solidFill>
                 <a:latin typeface="Consolas" panose="020B0609020204030204" pitchFamily="49" charset="0"/>
               </a:rPr>
-              <a:t>myName</a:t>
+              <a:t>'Name? '</a:t>
             </a:r>
             <a:r>
               <a:rPr lang="en-US" sz="2800" dirty="0">
                 <a:latin typeface="Consolas" panose="020B0609020204030204" pitchFamily="49" charset="0"/>
               </a:rPr>
               <a:t>)</a:t>
+            </a:r>
+          </a:p>
+          <a:p>
+            <a:r>
+              <a:rPr lang="en-US" sz="2800" dirty="0">
+                <a:latin typeface="Consolas" panose="020B0609020204030204" pitchFamily="49" charset="0"/>
+              </a:rPr>
+              <a:t>hello(myName)</a:t>
             </a:r>
           </a:p>
         </p:txBody>

</xml_diff>

<commit_message>
Updated functions .pptx to new color palette.
</commit_message>
<xml_diff>
--- a/presentations/03_functions.pptx
+++ b/presentations/03_functions.pptx
@@ -225,7 +225,7 @@
           <a:p>
             <a:fld id="{FD93C9B2-20F6-4DB1-B471-224337D0AC79}" type="datetimeFigureOut">
               <a:rPr lang="en-US" smtClean="0"/>
-              <a:t>11/1/2022</a:t>
+              <a:t>11/14/2022</a:t>
             </a:fld>
             <a:endParaRPr lang="en-US"/>
           </a:p>
@@ -3378,7 +3378,7 @@
           <a:p>
             <a:fld id="{C3F78080-8D0A-4BE8-A5B4-CB115102D524}" type="datetimeFigureOut">
               <a:rPr lang="en-US" smtClean="0"/>
-              <a:t>11/1/2022</a:t>
+              <a:t>11/14/2022</a:t>
             </a:fld>
             <a:endParaRPr lang="en-US"/>
           </a:p>
@@ -3576,7 +3576,7 @@
           <a:p>
             <a:fld id="{C3F78080-8D0A-4BE8-A5B4-CB115102D524}" type="datetimeFigureOut">
               <a:rPr lang="en-US" smtClean="0"/>
-              <a:t>11/1/2022</a:t>
+              <a:t>11/14/2022</a:t>
             </a:fld>
             <a:endParaRPr lang="en-US"/>
           </a:p>
@@ -3784,7 +3784,7 @@
           <a:p>
             <a:fld id="{C3F78080-8D0A-4BE8-A5B4-CB115102D524}" type="datetimeFigureOut">
               <a:rPr lang="en-US" smtClean="0"/>
-              <a:t>11/1/2022</a:t>
+              <a:t>11/14/2022</a:t>
             </a:fld>
             <a:endParaRPr lang="en-US"/>
           </a:p>
@@ -3982,7 +3982,7 @@
           <a:p>
             <a:fld id="{C3F78080-8D0A-4BE8-A5B4-CB115102D524}" type="datetimeFigureOut">
               <a:rPr lang="en-US" smtClean="0"/>
-              <a:t>11/1/2022</a:t>
+              <a:t>11/14/2022</a:t>
             </a:fld>
             <a:endParaRPr lang="en-US"/>
           </a:p>
@@ -4257,7 +4257,7 @@
           <a:p>
             <a:fld id="{C3F78080-8D0A-4BE8-A5B4-CB115102D524}" type="datetimeFigureOut">
               <a:rPr lang="en-US" smtClean="0"/>
-              <a:t>11/1/2022</a:t>
+              <a:t>11/14/2022</a:t>
             </a:fld>
             <a:endParaRPr lang="en-US"/>
           </a:p>
@@ -4522,7 +4522,7 @@
           <a:p>
             <a:fld id="{C3F78080-8D0A-4BE8-A5B4-CB115102D524}" type="datetimeFigureOut">
               <a:rPr lang="en-US" smtClean="0"/>
-              <a:t>11/1/2022</a:t>
+              <a:t>11/14/2022</a:t>
             </a:fld>
             <a:endParaRPr lang="en-US"/>
           </a:p>
@@ -4934,7 +4934,7 @@
           <a:p>
             <a:fld id="{C3F78080-8D0A-4BE8-A5B4-CB115102D524}" type="datetimeFigureOut">
               <a:rPr lang="en-US" smtClean="0"/>
-              <a:t>11/1/2022</a:t>
+              <a:t>11/14/2022</a:t>
             </a:fld>
             <a:endParaRPr lang="en-US"/>
           </a:p>
@@ -5075,7 +5075,7 @@
           <a:p>
             <a:fld id="{C3F78080-8D0A-4BE8-A5B4-CB115102D524}" type="datetimeFigureOut">
               <a:rPr lang="en-US" smtClean="0"/>
-              <a:t>11/1/2022</a:t>
+              <a:t>11/14/2022</a:t>
             </a:fld>
             <a:endParaRPr lang="en-US"/>
           </a:p>
@@ -5188,7 +5188,7 @@
           <a:p>
             <a:fld id="{C3F78080-8D0A-4BE8-A5B4-CB115102D524}" type="datetimeFigureOut">
               <a:rPr lang="en-US" smtClean="0"/>
-              <a:t>11/1/2022</a:t>
+              <a:t>11/14/2022</a:t>
             </a:fld>
             <a:endParaRPr lang="en-US"/>
           </a:p>
@@ -5499,7 +5499,7 @@
           <a:p>
             <a:fld id="{C3F78080-8D0A-4BE8-A5B4-CB115102D524}" type="datetimeFigureOut">
               <a:rPr lang="en-US" smtClean="0"/>
-              <a:t>11/1/2022</a:t>
+              <a:t>11/14/2022</a:t>
             </a:fld>
             <a:endParaRPr lang="en-US"/>
           </a:p>
@@ -5787,7 +5787,7 @@
           <a:p>
             <a:fld id="{C3F78080-8D0A-4BE8-A5B4-CB115102D524}" type="datetimeFigureOut">
               <a:rPr lang="en-US" smtClean="0"/>
-              <a:t>11/1/2022</a:t>
+              <a:t>11/14/2022</a:t>
             </a:fld>
             <a:endParaRPr lang="en-US"/>
           </a:p>
@@ -6028,7 +6028,7 @@
           <a:p>
             <a:fld id="{C3F78080-8D0A-4BE8-A5B4-CB115102D524}" type="datetimeFigureOut">
               <a:rPr lang="en-US" smtClean="0"/>
-              <a:t>11/1/2022</a:t>
+              <a:t>11/14/2022</a:t>
             </a:fld>
             <a:endParaRPr lang="en-US"/>
           </a:p>
@@ -6512,8 +6512,8 @@
         </p:blipFill>
         <p:spPr>
           <a:xfrm>
-            <a:off x="11361672" y="6049997"/>
-            <a:ext cx="786848" cy="786848"/>
+            <a:off x="11200705" y="5821251"/>
+            <a:ext cx="864635" cy="864635"/>
           </a:xfrm>
           <a:prstGeom prst="rect">
             <a:avLst/>
@@ -6632,28 +6632,14 @@
             <a:r>
               <a:rPr lang="en-US" sz="2800" dirty="0">
                 <a:solidFill>
-                  <a:srgbClr val="5EBB78"/>
+                  <a:schemeClr val="tx1">
+                    <a:lumMod val="65000"/>
+                    <a:lumOff val="35000"/>
+                  </a:schemeClr>
                 </a:solidFill>
                 <a:latin typeface="Consolas" panose="020B0609020204030204" pitchFamily="49" charset="0"/>
               </a:rPr>
-              <a:t>return</a:t>
-            </a:r>
-            <a:r>
-              <a:rPr lang="en-US" sz="2800" dirty="0">
-                <a:latin typeface="Consolas" panose="020B0609020204030204" pitchFamily="49" charset="0"/>
-              </a:rPr>
-              <a:t> </a:t>
-            </a:r>
-            <a:r>
-              <a:rPr lang="en-US" sz="2800" dirty="0">
-                <a:solidFill>
-                  <a:schemeClr val="accent2">
-                    <a:lumMod val="75000"/>
-                  </a:schemeClr>
-                </a:solidFill>
-                <a:latin typeface="Consolas" panose="020B0609020204030204" pitchFamily="49" charset="0"/>
-              </a:rPr>
-              <a:t>&lt;value1&gt;,&lt;value2&gt;, . . .</a:t>
+              <a:t>return &lt;value1&gt;,&lt;value2&gt;, . . .</a:t>
             </a:r>
           </a:p>
         </p:txBody>
@@ -6690,9 +6676,8 @@
             <a:r>
               <a:rPr lang="en-US" sz="3600" b="1" dirty="0">
                 <a:solidFill>
-                  <a:schemeClr val="tx1">
-                    <a:lumMod val="65000"/>
-                    <a:lumOff val="35000"/>
+                  <a:schemeClr val="bg2">
+                    <a:lumMod val="25000"/>
                   </a:schemeClr>
                 </a:solidFill>
                 <a:latin typeface="Avenir Heavy" panose="02000503020000020003" pitchFamily="2" charset="0"/>
@@ -6702,9 +6687,8 @@
             </a:r>
             <a:endParaRPr lang="en-US" sz="3600" b="1" dirty="0">
               <a:solidFill>
-                <a:schemeClr val="tx1">
-                  <a:lumMod val="65000"/>
-                  <a:lumOff val="35000"/>
+                <a:schemeClr val="bg2">
+                  <a:lumMod val="25000"/>
                 </a:schemeClr>
               </a:solidFill>
               <a:latin typeface="Avenir Heavy" panose="02000503020000020003" pitchFamily="2" charset="0"/>
@@ -7065,7 +7049,7 @@
           <p:cNvPr id="10" name="Picture 9" descr="A picture containing dark, gauge&#10;&#10;Description automatically generated">
             <a:extLst>
               <a:ext uri="{FF2B5EF4-FFF2-40B4-BE49-F238E27FC236}">
-                <a16:creationId xmlns:a16="http://schemas.microsoft.com/office/drawing/2014/main" id="{F176AA2F-7367-A0B3-5085-FCA420DC43B1}"/>
+                <a16:creationId xmlns:a16="http://schemas.microsoft.com/office/drawing/2014/main" id="{73FA8EC0-0B6C-E6EB-0CB4-16072AA21797}"/>
               </a:ext>
             </a:extLst>
           </p:cNvPr>
@@ -7496,9 +7480,8 @@
             <a:r>
               <a:rPr lang="en-US" sz="3600" b="1" dirty="0">
                 <a:solidFill>
-                  <a:schemeClr val="tx1">
-                    <a:lumMod val="65000"/>
-                    <a:lumOff val="35000"/>
+                  <a:schemeClr val="bg2">
+                    <a:lumMod val="25000"/>
                   </a:schemeClr>
                 </a:solidFill>
                 <a:latin typeface="Avenir Heavy" panose="02000503020000020003" pitchFamily="2" charset="0"/>
@@ -7508,9 +7491,8 @@
             </a:r>
             <a:endParaRPr lang="en-US" sz="3600" b="1" dirty="0">
               <a:solidFill>
-                <a:schemeClr val="tx1">
-                  <a:lumMod val="65000"/>
-                  <a:lumOff val="35000"/>
+                <a:schemeClr val="bg2">
+                  <a:lumMod val="25000"/>
                 </a:schemeClr>
               </a:solidFill>
               <a:latin typeface="Avenir Heavy" panose="02000503020000020003" pitchFamily="2" charset="0"/>
@@ -7523,7 +7505,7 @@
           <p:cNvPr id="5" name="Picture 4" descr="A picture containing dark, gauge&#10;&#10;Description automatically generated">
             <a:extLst>
               <a:ext uri="{FF2B5EF4-FFF2-40B4-BE49-F238E27FC236}">
-                <a16:creationId xmlns:a16="http://schemas.microsoft.com/office/drawing/2014/main" id="{E215AA27-1CAA-821B-411F-CD8CC1BA3F8A}"/>
+                <a16:creationId xmlns:a16="http://schemas.microsoft.com/office/drawing/2014/main" id="{FABCADEC-E214-2DA1-88C0-A90E0DEE3BF2}"/>
               </a:ext>
             </a:extLst>
           </p:cNvPr>
@@ -7686,7 +7668,9 @@
           <a:prstGeom prst="rect">
             <a:avLst/>
           </a:prstGeom>
-          <a:noFill/>
+          <a:solidFill>
+            <a:schemeClr val="bg1"/>
+          </a:solidFill>
         </p:spPr>
         <p:txBody>
           <a:bodyPr wrap="square" rtlCol="0">
@@ -7699,16 +7683,32 @@
             </a:pPr>
             <a:r>
               <a:rPr lang="en-US" sz="1400" dirty="0">
+                <a:solidFill>
+                  <a:schemeClr val="bg2">
+                    <a:lumMod val="75000"/>
+                  </a:schemeClr>
+                </a:solidFill>
                 <a:latin typeface="+mj-lt"/>
                 <a:ea typeface="Verdana" panose="020B0604030504040204" pitchFamily="34" charset="0"/>
               </a:rPr>
               <a:t>Image Credit: </a:t>
             </a:r>
             <a:r>
-              <a:rPr lang="en-US" sz="1400" dirty="0"/>
+              <a:rPr lang="en-US" sz="1400" dirty="0">
+                <a:solidFill>
+                  <a:schemeClr val="bg2">
+                    <a:lumMod val="75000"/>
+                  </a:schemeClr>
+                </a:solidFill>
+              </a:rPr>
               <a:t>https://www.pinterest.com/pin/558024210062835602/</a:t>
             </a:r>
             <a:endParaRPr lang="en-US" sz="1400" dirty="0">
+              <a:solidFill>
+                <a:schemeClr val="bg2">
+                  <a:lumMod val="75000"/>
+                </a:schemeClr>
+              </a:solidFill>
               <a:latin typeface="+mj-lt"/>
             </a:endParaRPr>
           </a:p>
@@ -7719,7 +7719,7 @@
           <p:cNvPr id="5" name="Picture 4" descr="A picture containing dark, gauge&#10;&#10;Description automatically generated">
             <a:extLst>
               <a:ext uri="{FF2B5EF4-FFF2-40B4-BE49-F238E27FC236}">
-                <a16:creationId xmlns:a16="http://schemas.microsoft.com/office/drawing/2014/main" id="{18AFDA4E-8E52-76D6-17E5-307EE22E0136}"/>
+                <a16:creationId xmlns:a16="http://schemas.microsoft.com/office/drawing/2014/main" id="{47C94F79-35DD-30CD-E442-1D0600DEDA68}"/>
               </a:ext>
             </a:extLst>
           </p:cNvPr>
@@ -7794,6 +7794,317 @@
       </p:grpSpPr>
       <p:sp>
         <p:nvSpPr>
+          <p:cNvPr id="2" name="TextBox 1">
+            <a:extLst>
+              <a:ext uri="{FF2B5EF4-FFF2-40B4-BE49-F238E27FC236}">
+                <a16:creationId xmlns:a16="http://schemas.microsoft.com/office/drawing/2014/main" id="{2C8698E5-8354-4A59-ABB7-0349000614A5}"/>
+              </a:ext>
+            </a:extLst>
+          </p:cNvPr>
+          <p:cNvSpPr txBox="1"/>
+          <p:nvPr/>
+        </p:nvSpPr>
+        <p:spPr>
+          <a:xfrm>
+            <a:off x="1812470" y="556972"/>
+            <a:ext cx="7995557" cy="1754326"/>
+          </a:xfrm>
+          <a:prstGeom prst="rect">
+            <a:avLst/>
+          </a:prstGeom>
+          <a:noFill/>
+        </p:spPr>
+        <p:txBody>
+          <a:bodyPr wrap="square" rtlCol="0">
+            <a:spAutoFit/>
+          </a:bodyPr>
+          <a:lstStyle/>
+          <a:p>
+            <a:pPr algn="ctr"/>
+            <a:r>
+              <a:rPr lang="en-US" sz="3600" b="1" dirty="0">
+                <a:solidFill>
+                  <a:schemeClr val="bg2">
+                    <a:lumMod val="25000"/>
+                  </a:schemeClr>
+                </a:solidFill>
+                <a:effectLst/>
+                <a:latin typeface="Avenir Heavy" panose="02000503020000020003" pitchFamily="2" charset="0"/>
+                <a:cs typeface="Courier New" panose="02070309020205020404" pitchFamily="49" charset="0"/>
+              </a:rPr>
+              <a:t>Specification</a:t>
+            </a:r>
+          </a:p>
+          <a:p>
+            <a:pPr algn="ctr"/>
+            <a:endParaRPr lang="en-US" sz="2400" b="0" i="0" dirty="0">
+              <a:solidFill>
+                <a:srgbClr val="000000"/>
+              </a:solidFill>
+              <a:effectLst/>
+              <a:latin typeface="Consolas" panose="020B0609020204030204" pitchFamily="49" charset="0"/>
+              <a:cs typeface="Courier New" panose="02070309020205020404" pitchFamily="49" charset="0"/>
+            </a:endParaRPr>
+          </a:p>
+          <a:p>
+            <a:pPr algn="ctr"/>
+            <a:r>
+              <a:rPr lang="en-US" sz="2400" dirty="0">
+                <a:solidFill>
+                  <a:srgbClr val="000000"/>
+                </a:solidFill>
+                <a:effectLst/>
+                <a:latin typeface="Avenir" panose="02000503020000020003" pitchFamily="2" charset="0"/>
+                <a:cs typeface="Courier New" panose="02070309020205020404" pitchFamily="49" charset="0"/>
+              </a:rPr>
+              <a:t>The </a:t>
+            </a:r>
+            <a:r>
+              <a:rPr lang="en-US" sz="2400" dirty="0">
+                <a:solidFill>
+                  <a:srgbClr val="482DFF"/>
+                </a:solidFill>
+                <a:effectLst/>
+                <a:latin typeface="Consolas" panose="020B0609020204030204" pitchFamily="49" charset="0"/>
+                <a:cs typeface="Consolas" panose="020B0609020204030204" pitchFamily="49" charset="0"/>
+              </a:rPr>
+              <a:t>multiply</a:t>
+            </a:r>
+            <a:r>
+              <a:rPr lang="en-US" sz="2400" dirty="0">
+                <a:solidFill>
+                  <a:srgbClr val="000000"/>
+                </a:solidFill>
+                <a:effectLst/>
+                <a:latin typeface="Consolas" panose="020B0609020204030204" pitchFamily="49" charset="0"/>
+                <a:cs typeface="Consolas" panose="020B0609020204030204" pitchFamily="49" charset="0"/>
+              </a:rPr>
+              <a:t>()</a:t>
+            </a:r>
+            <a:r>
+              <a:rPr lang="en-US" sz="2400" dirty="0">
+                <a:solidFill>
+                  <a:srgbClr val="000000"/>
+                </a:solidFill>
+                <a:effectLst/>
+                <a:latin typeface="Avenir" panose="02000503020000020003" pitchFamily="2" charset="0"/>
+                <a:cs typeface="Courier New" panose="02070309020205020404" pitchFamily="49" charset="0"/>
+              </a:rPr>
+              <a:t> function takes two arguments </a:t>
+            </a:r>
+          </a:p>
+          <a:p>
+            <a:pPr algn="ctr"/>
+            <a:r>
+              <a:rPr lang="en-US" sz="2400" dirty="0">
+                <a:solidFill>
+                  <a:srgbClr val="000000"/>
+                </a:solidFill>
+                <a:effectLst/>
+                <a:latin typeface="Consolas" panose="020B0609020204030204" pitchFamily="49" charset="0"/>
+                <a:cs typeface="Consolas" panose="020B0609020204030204" pitchFamily="49" charset="0"/>
+              </a:rPr>
+              <a:t>(arg_1, arg_2)</a:t>
+            </a:r>
+            <a:r>
+              <a:rPr lang="en-US" sz="2400" dirty="0">
+                <a:solidFill>
+                  <a:srgbClr val="000000"/>
+                </a:solidFill>
+                <a:effectLst/>
+                <a:latin typeface="Avenir" panose="02000503020000020003" pitchFamily="2" charset="0"/>
+                <a:cs typeface="Courier New" panose="02070309020205020404" pitchFamily="49" charset="0"/>
+              </a:rPr>
+              <a:t>, multiplies them, and returns the result.</a:t>
+            </a:r>
+          </a:p>
+        </p:txBody>
+      </p:sp>
+      <p:pic>
+        <p:nvPicPr>
+          <p:cNvPr id="4" name="Picture 3">
+            <a:extLst>
+              <a:ext uri="{FF2B5EF4-FFF2-40B4-BE49-F238E27FC236}">
+                <a16:creationId xmlns:a16="http://schemas.microsoft.com/office/drawing/2014/main" id="{A8933D68-98AC-47F5-9FFC-512B6F2F59EC}"/>
+              </a:ext>
+            </a:extLst>
+          </p:cNvPr>
+          <p:cNvPicPr>
+            <a:picLocks noChangeAspect="1"/>
+          </p:cNvPicPr>
+          <p:nvPr/>
+        </p:nvPicPr>
+        <p:blipFill>
+          <a:blip r:embed="rId3"/>
+          <a:stretch>
+            <a:fillRect/>
+          </a:stretch>
+        </p:blipFill>
+        <p:spPr>
+          <a:xfrm>
+            <a:off x="12465590" y="5054352"/>
+            <a:ext cx="12192000" cy="1280509"/>
+          </a:xfrm>
+          <a:prstGeom prst="rect">
+            <a:avLst/>
+          </a:prstGeom>
+        </p:spPr>
+      </p:pic>
+      <p:sp>
+        <p:nvSpPr>
+          <p:cNvPr id="3" name="TextBox 2">
+            <a:extLst>
+              <a:ext uri="{FF2B5EF4-FFF2-40B4-BE49-F238E27FC236}">
+                <a16:creationId xmlns:a16="http://schemas.microsoft.com/office/drawing/2014/main" id="{47BAE984-51CD-B104-D209-59934E44EA8A}"/>
+              </a:ext>
+            </a:extLst>
+          </p:cNvPr>
+          <p:cNvSpPr txBox="1"/>
+          <p:nvPr/>
+        </p:nvSpPr>
+        <p:spPr>
+          <a:xfrm>
+            <a:off x="470006" y="2619075"/>
+            <a:ext cx="11560630" cy="1569660"/>
+          </a:xfrm>
+          <a:prstGeom prst="rect">
+            <a:avLst/>
+          </a:prstGeom>
+          <a:solidFill>
+            <a:schemeClr val="bg1">
+              <a:lumMod val="95000"/>
+            </a:schemeClr>
+          </a:solidFill>
+          <a:ln>
+            <a:solidFill>
+              <a:schemeClr val="bg1">
+                <a:lumMod val="85000"/>
+              </a:schemeClr>
+            </a:solidFill>
+          </a:ln>
+        </p:spPr>
+        <p:txBody>
+          <a:bodyPr wrap="square">
+            <a:spAutoFit/>
+          </a:bodyPr>
+          <a:lstStyle/>
+          <a:p>
+            <a:r>
+              <a:rPr lang="en-US" sz="1600" dirty="0">
+                <a:solidFill>
+                  <a:srgbClr val="007C00"/>
+                </a:solidFill>
+                <a:latin typeface="Consolas" panose="020B0609020204030204" pitchFamily="49" charset="0"/>
+              </a:rPr>
+              <a:t>def</a:t>
+            </a:r>
+            <a:r>
+              <a:rPr lang="en-US" sz="1600" dirty="0">
+                <a:solidFill>
+                  <a:srgbClr val="FF00FF"/>
+                </a:solidFill>
+                <a:latin typeface="Consolas" panose="020B0609020204030204" pitchFamily="49" charset="0"/>
+              </a:rPr>
+              <a:t> </a:t>
+            </a:r>
+            <a:r>
+              <a:rPr lang="en-US" sz="1600" dirty="0">
+                <a:solidFill>
+                  <a:srgbClr val="482DFF"/>
+                </a:solidFill>
+                <a:latin typeface="Consolas" panose="020B0609020204030204" pitchFamily="49" charset="0"/>
+              </a:rPr>
+              <a:t>multiply</a:t>
+            </a:r>
+            <a:r>
+              <a:rPr lang="en-US" sz="1600" dirty="0">
+                <a:latin typeface="Consolas" panose="020B0609020204030204" pitchFamily="49" charset="0"/>
+              </a:rPr>
+              <a:t>(arg_1, arg_2):</a:t>
+            </a:r>
+          </a:p>
+          <a:p>
+            <a:r>
+              <a:rPr lang="en-US" sz="1600" dirty="0">
+                <a:latin typeface="Consolas" panose="020B0609020204030204" pitchFamily="49" charset="0"/>
+              </a:rPr>
+              <a:t>    </a:t>
+            </a:r>
+            <a:r>
+              <a:rPr lang="en-US" sz="1600" dirty="0">
+                <a:solidFill>
+                  <a:srgbClr val="BA2020"/>
+                </a:solidFill>
+                <a:latin typeface="Avenir Medium" panose="02000503020000020003" pitchFamily="2" charset="0"/>
+              </a:rPr>
+              <a:t>’ ’ ’</a:t>
+            </a:r>
+            <a:r>
+              <a:rPr lang="en-US" sz="1600" i="1" dirty="0">
+                <a:solidFill>
+                  <a:srgbClr val="BA2020"/>
+                </a:solidFill>
+                <a:latin typeface="Consolas" panose="020B0609020204030204" pitchFamily="49" charset="0"/>
+                <a:cs typeface="Consolas" panose="020B0609020204030204" pitchFamily="49" charset="0"/>
+              </a:rPr>
+              <a:t>This function takes two arguments (arg_1, arg2), multiplies them, and returns the result.</a:t>
+            </a:r>
+          </a:p>
+          <a:p>
+            <a:r>
+              <a:rPr lang="en-US" sz="1600" dirty="0">
+                <a:solidFill>
+                  <a:srgbClr val="BA2020"/>
+                </a:solidFill>
+                <a:latin typeface="Avenir Medium" panose="02000503020000020003" pitchFamily="2" charset="0"/>
+              </a:rPr>
+              <a:t>        ’ ‘ ’</a:t>
+            </a:r>
+            <a:endParaRPr lang="en-US" sz="1600" dirty="0">
+              <a:latin typeface="Consolas" panose="020B0609020204030204" pitchFamily="49" charset="0"/>
+            </a:endParaRPr>
+          </a:p>
+          <a:p>
+            <a:r>
+              <a:rPr lang="en-US" sz="1600" dirty="0">
+                <a:solidFill>
+                  <a:srgbClr val="007C00"/>
+                </a:solidFill>
+                <a:latin typeface="Consolas" panose="020B0609020204030204" pitchFamily="49" charset="0"/>
+              </a:rPr>
+              <a:t>    return</a:t>
+            </a:r>
+            <a:r>
+              <a:rPr lang="en-US" sz="1600" dirty="0">
+                <a:latin typeface="Consolas" panose="020B0609020204030204" pitchFamily="49" charset="0"/>
+              </a:rPr>
+              <a:t>(arg_1 * arg_2)</a:t>
+            </a:r>
+          </a:p>
+          <a:p>
+            <a:endParaRPr lang="en-US" sz="1600" dirty="0">
+              <a:solidFill>
+                <a:srgbClr val="FFC000"/>
+              </a:solidFill>
+              <a:latin typeface="Consolas" panose="020B0609020204030204" pitchFamily="49" charset="0"/>
+            </a:endParaRPr>
+          </a:p>
+          <a:p>
+            <a:r>
+              <a:rPr lang="en-US" sz="1600" i="1" dirty="0">
+                <a:solidFill>
+                  <a:srgbClr val="698F91"/>
+                </a:solidFill>
+                <a:latin typeface="Consolas" panose="020B0609020204030204" pitchFamily="49" charset="0"/>
+                <a:cs typeface="Consolas" panose="020B0609020204030204" pitchFamily="49" charset="0"/>
+              </a:rPr>
+              <a:t># end multiply()</a:t>
+            </a:r>
+          </a:p>
+        </p:txBody>
+      </p:sp>
+      <p:sp>
+        <p:nvSpPr>
           <p:cNvPr id="5" name="TextBox 4">
             <a:extLst>
               <a:ext uri="{FF2B5EF4-FFF2-40B4-BE49-F238E27FC236}">
@@ -7841,324 +8152,12 @@
           </a:p>
         </p:txBody>
       </p:sp>
-      <p:sp>
-        <p:nvSpPr>
-          <p:cNvPr id="2" name="TextBox 1">
-            <a:extLst>
-              <a:ext uri="{FF2B5EF4-FFF2-40B4-BE49-F238E27FC236}">
-                <a16:creationId xmlns:a16="http://schemas.microsoft.com/office/drawing/2014/main" id="{2C8698E5-8354-4A59-ABB7-0349000614A5}"/>
-              </a:ext>
-            </a:extLst>
-          </p:cNvPr>
-          <p:cNvSpPr txBox="1"/>
-          <p:nvPr/>
-        </p:nvSpPr>
-        <p:spPr>
-          <a:xfrm>
-            <a:off x="1812470" y="556972"/>
-            <a:ext cx="7995557" cy="1754326"/>
-          </a:xfrm>
-          <a:prstGeom prst="rect">
-            <a:avLst/>
-          </a:prstGeom>
-          <a:noFill/>
-        </p:spPr>
-        <p:txBody>
-          <a:bodyPr wrap="square" rtlCol="0">
-            <a:spAutoFit/>
-          </a:bodyPr>
-          <a:lstStyle/>
-          <a:p>
-            <a:pPr algn="ctr"/>
-            <a:r>
-              <a:rPr lang="en-US" sz="3600" b="1" dirty="0">
-                <a:solidFill>
-                  <a:schemeClr val="tx1">
-                    <a:lumMod val="65000"/>
-                    <a:lumOff val="35000"/>
-                  </a:schemeClr>
-                </a:solidFill>
-                <a:effectLst/>
-                <a:latin typeface="Avenir Heavy" panose="02000503020000020003" pitchFamily="2" charset="0"/>
-                <a:cs typeface="Courier New" panose="02070309020205020404" pitchFamily="49" charset="0"/>
-              </a:rPr>
-              <a:t>Specification</a:t>
-            </a:r>
-          </a:p>
-          <a:p>
-            <a:pPr algn="ctr"/>
-            <a:endParaRPr lang="en-US" sz="2400" b="0" i="0" dirty="0">
-              <a:solidFill>
-                <a:srgbClr val="000000"/>
-              </a:solidFill>
-              <a:effectLst/>
-              <a:latin typeface="Consolas" panose="020B0609020204030204" pitchFamily="49" charset="0"/>
-              <a:cs typeface="Courier New" panose="02070309020205020404" pitchFamily="49" charset="0"/>
-            </a:endParaRPr>
-          </a:p>
-          <a:p>
-            <a:pPr algn="ctr"/>
-            <a:r>
-              <a:rPr lang="en-US" sz="2400" dirty="0">
-                <a:solidFill>
-                  <a:srgbClr val="000000"/>
-                </a:solidFill>
-                <a:effectLst/>
-                <a:latin typeface="Avenir" panose="02000503020000020003" pitchFamily="2" charset="0"/>
-                <a:cs typeface="Courier New" panose="02070309020205020404" pitchFamily="49" charset="0"/>
-              </a:rPr>
-              <a:t>The </a:t>
-            </a:r>
-            <a:r>
-              <a:rPr lang="en-US" sz="2400" dirty="0">
-                <a:solidFill>
-                  <a:srgbClr val="482DFF"/>
-                </a:solidFill>
-                <a:effectLst/>
-                <a:latin typeface="Consolas" panose="020B0609020204030204" pitchFamily="49" charset="0"/>
-                <a:cs typeface="Consolas" panose="020B0609020204030204" pitchFamily="49" charset="0"/>
-              </a:rPr>
-              <a:t>multiply</a:t>
-            </a:r>
-            <a:r>
-              <a:rPr lang="en-US" sz="2400" dirty="0">
-                <a:solidFill>
-                  <a:srgbClr val="000000"/>
-                </a:solidFill>
-                <a:effectLst/>
-                <a:latin typeface="Consolas" panose="020B0609020204030204" pitchFamily="49" charset="0"/>
-                <a:cs typeface="Consolas" panose="020B0609020204030204" pitchFamily="49" charset="0"/>
-              </a:rPr>
-              <a:t>()</a:t>
-            </a:r>
-            <a:r>
-              <a:rPr lang="en-US" sz="2400" dirty="0">
-                <a:solidFill>
-                  <a:srgbClr val="000000"/>
-                </a:solidFill>
-                <a:effectLst/>
-                <a:latin typeface="Avenir" panose="02000503020000020003" pitchFamily="2" charset="0"/>
-                <a:cs typeface="Courier New" panose="02070309020205020404" pitchFamily="49" charset="0"/>
-              </a:rPr>
-              <a:t> function takes two arguments </a:t>
-            </a:r>
-          </a:p>
-          <a:p>
-            <a:pPr algn="ctr"/>
-            <a:r>
-              <a:rPr lang="en-US" sz="2400" dirty="0">
-                <a:solidFill>
-                  <a:srgbClr val="000000"/>
-                </a:solidFill>
-                <a:effectLst/>
-                <a:latin typeface="Consolas" panose="020B0609020204030204" pitchFamily="49" charset="0"/>
-                <a:cs typeface="Consolas" panose="020B0609020204030204" pitchFamily="49" charset="0"/>
-              </a:rPr>
-              <a:t>(arg_1, arg_2)</a:t>
-            </a:r>
-            <a:r>
-              <a:rPr lang="en-US" sz="2400" dirty="0">
-                <a:solidFill>
-                  <a:srgbClr val="000000"/>
-                </a:solidFill>
-                <a:effectLst/>
-                <a:latin typeface="Avenir" panose="02000503020000020003" pitchFamily="2" charset="0"/>
-                <a:cs typeface="Courier New" panose="02070309020205020404" pitchFamily="49" charset="0"/>
-              </a:rPr>
-              <a:t>, multiplies them, and returns the result.</a:t>
-            </a:r>
-          </a:p>
-        </p:txBody>
-      </p:sp>
-      <p:pic>
-        <p:nvPicPr>
-          <p:cNvPr id="4" name="Picture 3">
-            <a:extLst>
-              <a:ext uri="{FF2B5EF4-FFF2-40B4-BE49-F238E27FC236}">
-                <a16:creationId xmlns:a16="http://schemas.microsoft.com/office/drawing/2014/main" id="{A8933D68-98AC-47F5-9FFC-512B6F2F59EC}"/>
-              </a:ext>
-            </a:extLst>
-          </p:cNvPr>
-          <p:cNvPicPr>
-            <a:picLocks noChangeAspect="1"/>
-          </p:cNvPicPr>
-          <p:nvPr/>
-        </p:nvPicPr>
-        <p:blipFill>
-          <a:blip r:embed="rId3"/>
-          <a:stretch>
-            <a:fillRect/>
-          </a:stretch>
-        </p:blipFill>
-        <p:spPr>
-          <a:xfrm>
-            <a:off x="389370" y="4470087"/>
-            <a:ext cx="11641266" cy="1280509"/>
-          </a:xfrm>
-          <a:prstGeom prst="rect">
-            <a:avLst/>
-          </a:prstGeom>
-        </p:spPr>
-      </p:pic>
-      <p:sp>
-        <p:nvSpPr>
-          <p:cNvPr id="3" name="TextBox 2">
-            <a:extLst>
-              <a:ext uri="{FF2B5EF4-FFF2-40B4-BE49-F238E27FC236}">
-                <a16:creationId xmlns:a16="http://schemas.microsoft.com/office/drawing/2014/main" id="{47BAE984-51CD-B104-D209-59934E44EA8A}"/>
-              </a:ext>
-            </a:extLst>
-          </p:cNvPr>
-          <p:cNvSpPr txBox="1"/>
-          <p:nvPr/>
-        </p:nvSpPr>
-        <p:spPr>
-          <a:xfrm>
-            <a:off x="470006" y="2619075"/>
-            <a:ext cx="11560630" cy="1569660"/>
-          </a:xfrm>
-          <a:prstGeom prst="rect">
-            <a:avLst/>
-          </a:prstGeom>
-          <a:solidFill>
-            <a:schemeClr val="bg1">
-              <a:lumMod val="95000"/>
-            </a:schemeClr>
-          </a:solidFill>
-          <a:ln>
-            <a:solidFill>
-              <a:schemeClr val="bg1">
-                <a:lumMod val="85000"/>
-              </a:schemeClr>
-            </a:solidFill>
-          </a:ln>
-        </p:spPr>
-        <p:txBody>
-          <a:bodyPr wrap="square">
-            <a:spAutoFit/>
-          </a:bodyPr>
-          <a:lstStyle/>
-          <a:p>
-            <a:r>
-              <a:rPr lang="en-US" sz="1600" dirty="0">
-                <a:solidFill>
-                  <a:srgbClr val="007C00"/>
-                </a:solidFill>
-                <a:latin typeface="Consolas" panose="020B0609020204030204" pitchFamily="49" charset="0"/>
-              </a:rPr>
-              <a:t>def</a:t>
-            </a:r>
-            <a:r>
-              <a:rPr lang="en-US" sz="1600" dirty="0">
-                <a:solidFill>
-                  <a:srgbClr val="FF00FF"/>
-                </a:solidFill>
-                <a:latin typeface="Consolas" panose="020B0609020204030204" pitchFamily="49" charset="0"/>
-              </a:rPr>
-              <a:t> </a:t>
-            </a:r>
-            <a:r>
-              <a:rPr lang="en-US" sz="1600" dirty="0">
-                <a:solidFill>
-                  <a:srgbClr val="482DFF"/>
-                </a:solidFill>
-                <a:latin typeface="Consolas" panose="020B0609020204030204" pitchFamily="49" charset="0"/>
-              </a:rPr>
-              <a:t>multiply</a:t>
-            </a:r>
-            <a:r>
-              <a:rPr lang="en-US" sz="1600" dirty="0">
-                <a:latin typeface="Consolas" panose="020B0609020204030204" pitchFamily="49" charset="0"/>
-              </a:rPr>
-              <a:t>(arg_1, arg_2):</a:t>
-            </a:r>
-          </a:p>
-          <a:p>
-            <a:r>
-              <a:rPr lang="en-US" sz="1600" dirty="0">
-                <a:latin typeface="Consolas" panose="020B0609020204030204" pitchFamily="49" charset="0"/>
-              </a:rPr>
-              <a:t>    </a:t>
-            </a:r>
-            <a:r>
-              <a:rPr lang="en-US" sz="1600" dirty="0">
-                <a:solidFill>
-                  <a:srgbClr val="BA2020"/>
-                </a:solidFill>
-                <a:latin typeface="Avenir Medium" panose="02000503020000020003" pitchFamily="2" charset="0"/>
-              </a:rPr>
-              <a:t>’ ’ ’</a:t>
-            </a:r>
-            <a:r>
-              <a:rPr lang="en-US" sz="1600" i="1" dirty="0">
-                <a:solidFill>
-                  <a:srgbClr val="BA2020"/>
-                </a:solidFill>
-                <a:latin typeface="Consolas" panose="020B0609020204030204" pitchFamily="49" charset="0"/>
-                <a:cs typeface="Consolas" panose="020B0609020204030204" pitchFamily="49" charset="0"/>
-              </a:rPr>
-              <a:t>This function takes two arguments (arg_1, arg2), multiplies them, and returns the result.</a:t>
-            </a:r>
-          </a:p>
-          <a:p>
-            <a:r>
-              <a:rPr lang="en-US" sz="1600" dirty="0">
-                <a:solidFill>
-                  <a:srgbClr val="BA2020"/>
-                </a:solidFill>
-                <a:latin typeface="Avenir Medium" panose="02000503020000020003" pitchFamily="2" charset="0"/>
-              </a:rPr>
-              <a:t>        ’ ‘ ’</a:t>
-            </a:r>
-            <a:endParaRPr lang="en-US" sz="1600" dirty="0">
-              <a:latin typeface="Consolas" panose="020B0609020204030204" pitchFamily="49" charset="0"/>
-            </a:endParaRPr>
-          </a:p>
-          <a:p>
-            <a:r>
-              <a:rPr lang="en-US" sz="1600" dirty="0">
-                <a:solidFill>
-                  <a:srgbClr val="007C00"/>
-                </a:solidFill>
-                <a:latin typeface="Consolas" panose="020B0609020204030204" pitchFamily="49" charset="0"/>
-              </a:rPr>
-              <a:t>    return</a:t>
-            </a:r>
-            <a:r>
-              <a:rPr lang="en-US" sz="1600" dirty="0">
-                <a:latin typeface="Consolas" panose="020B0609020204030204" pitchFamily="49" charset="0"/>
-              </a:rPr>
-              <a:t>(arg_1 * arg_2)</a:t>
-            </a:r>
-          </a:p>
-          <a:p>
-            <a:endParaRPr lang="en-US" sz="1600" dirty="0">
-              <a:solidFill>
-                <a:srgbClr val="FFC000"/>
-              </a:solidFill>
-              <a:latin typeface="Consolas" panose="020B0609020204030204" pitchFamily="49" charset="0"/>
-            </a:endParaRPr>
-          </a:p>
-          <a:p>
-            <a:r>
-              <a:rPr lang="en-US" sz="1600" i="1" dirty="0">
-                <a:solidFill>
-                  <a:srgbClr val="698F91"/>
-                </a:solidFill>
-                <a:latin typeface="Consolas" panose="020B0609020204030204" pitchFamily="49" charset="0"/>
-                <a:cs typeface="Consolas" panose="020B0609020204030204" pitchFamily="49" charset="0"/>
-              </a:rPr>
-              <a:t># end multiply()</a:t>
-            </a:r>
-          </a:p>
-        </p:txBody>
-      </p:sp>
       <p:pic>
         <p:nvPicPr>
           <p:cNvPr id="7" name="Picture 6" descr="A picture containing dark, gauge&#10;&#10;Description automatically generated">
             <a:extLst>
               <a:ext uri="{FF2B5EF4-FFF2-40B4-BE49-F238E27FC236}">
-                <a16:creationId xmlns:a16="http://schemas.microsoft.com/office/drawing/2014/main" id="{A7F5BC5C-B78E-15E2-48D5-A8E7D2E76AD4}"/>
+                <a16:creationId xmlns:a16="http://schemas.microsoft.com/office/drawing/2014/main" id="{49C8AD2F-E589-606E-1D72-D210295BB040}"/>
               </a:ext>
             </a:extLst>
           </p:cNvPr>
@@ -8384,9 +8383,9 @@
       </p:par>
     </p:tnLst>
     <p:bldLst>
-      <p:bldP spid="5" grpId="0" animBg="1"/>
       <p:bldP spid="2" grpId="0"/>
       <p:bldP spid="3" grpId="0" animBg="1"/>
+      <p:bldP spid="5" grpId="0" animBg="1"/>
     </p:bldLst>
   </p:timing>
 </p:sld>
@@ -8471,12 +8470,54 @@
           </a:p>
         </p:txBody>
       </p:sp>
+      <p:sp>
+        <p:nvSpPr>
+          <p:cNvPr id="6" name="TextBox 5">
+            <a:extLst>
+              <a:ext uri="{FF2B5EF4-FFF2-40B4-BE49-F238E27FC236}">
+                <a16:creationId xmlns:a16="http://schemas.microsoft.com/office/drawing/2014/main" id="{526DFB79-4A76-8D4D-24AD-AF60D9EBA903}"/>
+              </a:ext>
+            </a:extLst>
+          </p:cNvPr>
+          <p:cNvSpPr txBox="1"/>
+          <p:nvPr/>
+        </p:nvSpPr>
+        <p:spPr>
+          <a:xfrm>
+            <a:off x="-116541" y="714367"/>
+            <a:ext cx="3074895" cy="553998"/>
+          </a:xfrm>
+          <a:prstGeom prst="rect">
+            <a:avLst/>
+          </a:prstGeom>
+          <a:noFill/>
+        </p:spPr>
+        <p:txBody>
+          <a:bodyPr wrap="square" rtlCol="0">
+            <a:spAutoFit/>
+          </a:bodyPr>
+          <a:lstStyle/>
+          <a:p>
+            <a:pPr algn="ctr"/>
+            <a:r>
+              <a:rPr lang="en-US" sz="3000" dirty="0">
+                <a:solidFill>
+                  <a:schemeClr val="bg1"/>
+                </a:solidFill>
+                <a:latin typeface="Avenir Medium" panose="02000503020000020003" pitchFamily="2" charset="0"/>
+                <a:cs typeface="Futura Medium" panose="020B0602020204020303" pitchFamily="34" charset="-79"/>
+              </a:rPr>
+              <a:t>Exercise</a:t>
+            </a:r>
+          </a:p>
+        </p:txBody>
+      </p:sp>
       <p:grpSp>
         <p:nvGrpSpPr>
-          <p:cNvPr id="2" name="Group 1">
-            <a:extLst>
-              <a:ext uri="{FF2B5EF4-FFF2-40B4-BE49-F238E27FC236}">
-                <a16:creationId xmlns:a16="http://schemas.microsoft.com/office/drawing/2014/main" id="{0CC8A287-66D4-BA43-7522-9BEAF0FFF509}"/>
+          <p:cNvPr id="3" name="Group 2">
+            <a:extLst>
+              <a:ext uri="{FF2B5EF4-FFF2-40B4-BE49-F238E27FC236}">
+                <a16:creationId xmlns:a16="http://schemas.microsoft.com/office/drawing/2014/main" id="{D0F036F9-E9EB-3D60-ECFA-F044AD7E7A9B}"/>
               </a:ext>
             </a:extLst>
           </p:cNvPr>
@@ -8493,10 +8534,10 @@
         </p:grpSpPr>
         <p:sp>
           <p:nvSpPr>
-            <p:cNvPr id="5" name="Pentagon 4">
+            <p:cNvPr id="8" name="Pentagon 7">
               <a:extLst>
                 <a:ext uri="{FF2B5EF4-FFF2-40B4-BE49-F238E27FC236}">
-                  <a16:creationId xmlns:a16="http://schemas.microsoft.com/office/drawing/2014/main" id="{560BE491-E8A9-839A-186C-38B50FF61CC2}"/>
+                  <a16:creationId xmlns:a16="http://schemas.microsoft.com/office/drawing/2014/main" id="{3D11DA76-C67D-59DB-D6EF-33B0D17A4DF5}"/>
                 </a:ext>
               </a:extLst>
             </p:cNvPr>
@@ -8512,10 +8553,12 @@
               <a:avLst/>
             </a:prstGeom>
             <a:solidFill>
-              <a:srgbClr val="6D6CCA"/>
+              <a:srgbClr val="5A5AA8"/>
             </a:solidFill>
-            <a:ln w="44450">
-              <a:noFill/>
+            <a:ln w="6350">
+              <a:solidFill>
+                <a:schemeClr val="tx1"/>
+              </a:solidFill>
             </a:ln>
             <a:effectLst/>
           </p:spPr>
@@ -8546,10 +8589,10 @@
         </p:sp>
         <p:sp>
           <p:nvSpPr>
-            <p:cNvPr id="6" name="TextBox 5">
+            <p:cNvPr id="9" name="TextBox 8">
               <a:extLst>
                 <a:ext uri="{FF2B5EF4-FFF2-40B4-BE49-F238E27FC236}">
-                  <a16:creationId xmlns:a16="http://schemas.microsoft.com/office/drawing/2014/main" id="{526DFB79-4A76-8D4D-24AD-AF60D9EBA903}"/>
+                  <a16:creationId xmlns:a16="http://schemas.microsoft.com/office/drawing/2014/main" id="{6899920E-2FA2-78B4-8562-A076034038D7}"/>
                 </a:ext>
               </a:extLst>
             </p:cNvPr>
@@ -8589,10 +8632,10 @@
       </p:grpSp>
       <p:pic>
         <p:nvPicPr>
-          <p:cNvPr id="8" name="Picture 7" descr="A picture containing dark, gauge&#10;&#10;Description automatically generated">
-            <a:extLst>
-              <a:ext uri="{FF2B5EF4-FFF2-40B4-BE49-F238E27FC236}">
-                <a16:creationId xmlns:a16="http://schemas.microsoft.com/office/drawing/2014/main" id="{3388D10A-F9A1-60B9-508B-224EE3E1FD86}"/>
+          <p:cNvPr id="10" name="Picture 9" descr="A picture containing dark, gauge&#10;&#10;Description automatically generated">
+            <a:extLst>
+              <a:ext uri="{FF2B5EF4-FFF2-40B4-BE49-F238E27FC236}">
+                <a16:creationId xmlns:a16="http://schemas.microsoft.com/office/drawing/2014/main" id="{2BE5B1F9-E767-04E2-D406-B8269E6F0E29}"/>
               </a:ext>
             </a:extLst>
           </p:cNvPr>
@@ -8770,10 +8813,7 @@
             <a:r>
               <a:rPr lang="en-US" b="1" dirty="0">
                 <a:solidFill>
-                  <a:schemeClr val="tx1">
-                    <a:lumMod val="65000"/>
-                    <a:lumOff val="35000"/>
-                  </a:schemeClr>
+                  <a:srgbClr val="30335D"/>
                 </a:solidFill>
                 <a:latin typeface="Avenir Heavy" panose="02000503020000020003" pitchFamily="2" charset="0"/>
               </a:rPr>
@@ -8784,10 +8824,10 @@
       </p:sp>
       <p:pic>
         <p:nvPicPr>
-          <p:cNvPr id="8" name="Picture 7" descr="A picture containing dark, gauge&#10;&#10;Description automatically generated">
-            <a:extLst>
-              <a:ext uri="{FF2B5EF4-FFF2-40B4-BE49-F238E27FC236}">
-                <a16:creationId xmlns:a16="http://schemas.microsoft.com/office/drawing/2014/main" id="{66EFFAE8-F5FE-9789-F7F5-D1FE8BC80D2C}"/>
+          <p:cNvPr id="7" name="Graphic 6" descr="Repeat with solid fill">
+            <a:extLst>
+              <a:ext uri="{FF2B5EF4-FFF2-40B4-BE49-F238E27FC236}">
+                <a16:creationId xmlns:a16="http://schemas.microsoft.com/office/drawing/2014/main" id="{4940B1E0-0CE0-550E-DED9-62715005FC42}"/>
               </a:ext>
             </a:extLst>
           </p:cNvPr>
@@ -8799,15 +8839,48 @@
         <p:blipFill>
           <a:blip r:embed="rId3">
             <a:extLst>
-              <a:ext uri="{BEBA8EAE-BF5A-486C-A8C5-ECC9F3942E4B}">
-                <a14:imgProps xmlns:a14="http://schemas.microsoft.com/office/drawing/2010/main">
-                  <a14:imgLayer r:embed="rId4">
-                    <a14:imgEffect>
-                      <a14:brightnessContrast bright="20000" contrast="40000"/>
-                    </a14:imgEffect>
-                  </a14:imgLayer>
-                </a14:imgProps>
-              </a:ext>
+              <a:ext uri="{28A0092B-C50C-407E-A947-70E740481C1C}">
+                <a14:useLocalDpi xmlns:a14="http://schemas.microsoft.com/office/drawing/2010/main" val="0"/>
+              </a:ext>
+              <a:ext uri="{96DAC541-7B7A-43D3-8B79-37D633B846F1}">
+                <asvg:svgBlip xmlns:asvg="http://schemas.microsoft.com/office/drawing/2016/SVG/main" r:embed="rId4"/>
+              </a:ext>
+            </a:extLst>
+          </a:blip>
+          <a:stretch>
+            <a:fillRect/>
+          </a:stretch>
+        </p:blipFill>
+        <p:spPr>
+          <a:xfrm rot="20015256">
+            <a:off x="3896904" y="1364961"/>
+            <a:ext cx="4128076" cy="4128076"/>
+          </a:xfrm>
+          <a:prstGeom prst="rect">
+            <a:avLst/>
+          </a:prstGeom>
+          <a:effectLst>
+            <a:reflection blurRad="6350" stA="52000" endA="300" endPos="35000" dir="5400000" sy="-100000" algn="bl" rotWithShape="0"/>
+          </a:effectLst>
+        </p:spPr>
+      </p:pic>
+      <p:pic>
+        <p:nvPicPr>
+          <p:cNvPr id="5" name="Picture 4" descr="A picture containing dark, gauge&#10;&#10;Description automatically generated">
+            <a:extLst>
+              <a:ext uri="{FF2B5EF4-FFF2-40B4-BE49-F238E27FC236}">
+                <a16:creationId xmlns:a16="http://schemas.microsoft.com/office/drawing/2014/main" id="{F7115C99-330F-0BB0-C69E-EF160FA2379E}"/>
+              </a:ext>
+            </a:extLst>
+          </p:cNvPr>
+          <p:cNvPicPr>
+            <a:picLocks noChangeAspect="1"/>
+          </p:cNvPicPr>
+          <p:nvPr/>
+        </p:nvPicPr>
+        <p:blipFill>
+          <a:blip r:embed="rId5">
+            <a:extLst>
               <a:ext uri="{28A0092B-C50C-407E-A947-70E740481C1C}">
                 <a14:useLocalDpi xmlns:a14="http://schemas.microsoft.com/office/drawing/2010/main" val="0"/>
               </a:ext>
@@ -8819,69 +8892,12 @@
         </p:blipFill>
         <p:spPr>
           <a:xfrm>
-            <a:off x="11378037" y="6031948"/>
+            <a:off x="11378037" y="6045200"/>
             <a:ext cx="800100" cy="812800"/>
           </a:xfrm>
           <a:prstGeom prst="rect">
             <a:avLst/>
           </a:prstGeom>
-        </p:spPr>
-      </p:pic>
-      <p:pic>
-        <p:nvPicPr>
-          <p:cNvPr id="5" name="Picture 4" descr="Blue Arrow PNG Images, Free Transparent Blue Arrow Download - KindPNG">
-            <a:extLst>
-              <a:ext uri="{FF2B5EF4-FFF2-40B4-BE49-F238E27FC236}">
-                <a16:creationId xmlns:a16="http://schemas.microsoft.com/office/drawing/2014/main" id="{8FC3771E-9FC5-6240-90D4-3F1DC5C7C475}"/>
-              </a:ext>
-            </a:extLst>
-          </p:cNvPr>
-          <p:cNvPicPr>
-            <a:picLocks noChangeAspect="1" noChangeArrowheads="1"/>
-          </p:cNvPicPr>
-          <p:nvPr/>
-        </p:nvPicPr>
-        <p:blipFill>
-          <a:blip r:embed="rId5">
-            <a:clrChange>
-              <a:clrFrom>
-                <a:srgbClr val="F6F6F6"/>
-              </a:clrFrom>
-              <a:clrTo>
-                <a:srgbClr val="F6F6F6">
-                  <a:alpha val="0"/>
-                </a:srgbClr>
-              </a:clrTo>
-            </a:clrChange>
-            <a:extLst>
-              <a:ext uri="{28A0092B-C50C-407E-A947-70E740481C1C}">
-                <a14:useLocalDpi xmlns:a14="http://schemas.microsoft.com/office/drawing/2010/main" val="0"/>
-              </a:ext>
-            </a:extLst>
-          </a:blip>
-          <a:srcRect/>
-          <a:stretch>
-            <a:fillRect/>
-          </a:stretch>
-        </p:blipFill>
-        <p:spPr bwMode="auto">
-          <a:xfrm>
-            <a:off x="4418597" y="2113092"/>
-            <a:ext cx="3354805" cy="3354805"/>
-          </a:xfrm>
-          <a:prstGeom prst="rect">
-            <a:avLst/>
-          </a:prstGeom>
-          <a:noFill/>
-          <a:extLst>
-            <a:ext uri="{909E8E84-426E-40DD-AFC4-6F175D3DCCD1}">
-              <a14:hiddenFill xmlns:a14="http://schemas.microsoft.com/office/drawing/2010/main">
-                <a:solidFill>
-                  <a:srgbClr val="FFFFFF"/>
-                </a:solidFill>
-              </a14:hiddenFill>
-            </a:ext>
-          </a:extLst>
         </p:spPr>
       </p:pic>
     </p:spTree>
@@ -9029,636 +9045,12 @@
           </a:p>
         </p:txBody>
       </p:sp>
-      <p:sp>
-        <p:nvSpPr>
-          <p:cNvPr id="2" name="TextBox 1">
-            <a:extLst>
-              <a:ext uri="{FF2B5EF4-FFF2-40B4-BE49-F238E27FC236}">
-                <a16:creationId xmlns:a16="http://schemas.microsoft.com/office/drawing/2014/main" id="{71173FB2-C364-41E7-F052-9AF668132589}"/>
-              </a:ext>
-            </a:extLst>
-          </p:cNvPr>
-          <p:cNvSpPr txBox="1"/>
-          <p:nvPr/>
-        </p:nvSpPr>
-        <p:spPr>
-          <a:xfrm>
-            <a:off x="8053574" y="2707574"/>
-            <a:ext cx="1900051" cy="461665"/>
-          </a:xfrm>
-          <a:prstGeom prst="rect">
-            <a:avLst/>
-          </a:prstGeom>
-          <a:solidFill>
-            <a:schemeClr val="bg1"/>
-          </a:solidFill>
-        </p:spPr>
-        <p:txBody>
-          <a:bodyPr wrap="square" rtlCol="0">
-            <a:spAutoFit/>
-          </a:bodyPr>
-          <a:lstStyle/>
-          <a:p>
-            <a:r>
-              <a:rPr lang="en-US" sz="2400" b="1" dirty="0">
-                <a:solidFill>
-                  <a:srgbClr val="5EBB78"/>
-                </a:solidFill>
-                <a:latin typeface="Avenir Black" panose="02000503020000020003" pitchFamily="2" charset="0"/>
-              </a:rPr>
-              <a:t>Attributes</a:t>
-            </a:r>
-          </a:p>
-        </p:txBody>
-      </p:sp>
-      <p:sp>
-        <p:nvSpPr>
-          <p:cNvPr id="3" name="TextBox 2">
-            <a:extLst>
-              <a:ext uri="{FF2B5EF4-FFF2-40B4-BE49-F238E27FC236}">
-                <a16:creationId xmlns:a16="http://schemas.microsoft.com/office/drawing/2014/main" id="{87BC6C80-2B1F-8072-2312-8383B1C0F8EE}"/>
-              </a:ext>
-            </a:extLst>
-          </p:cNvPr>
-          <p:cNvSpPr txBox="1"/>
-          <p:nvPr/>
-        </p:nvSpPr>
-        <p:spPr>
-          <a:xfrm>
-            <a:off x="8346375" y="4151646"/>
-            <a:ext cx="1900051" cy="461665"/>
-          </a:xfrm>
-          <a:prstGeom prst="rect">
-            <a:avLst/>
-          </a:prstGeom>
-          <a:solidFill>
-            <a:schemeClr val="bg1"/>
-          </a:solidFill>
-        </p:spPr>
-        <p:txBody>
-          <a:bodyPr wrap="square" rtlCol="0">
-            <a:spAutoFit/>
-          </a:bodyPr>
-          <a:lstStyle/>
-          <a:p>
-            <a:r>
-              <a:rPr lang="en-US" sz="2400" b="1" dirty="0">
-                <a:solidFill>
-                  <a:srgbClr val="5EBB78"/>
-                </a:solidFill>
-                <a:latin typeface="Avenir Black" panose="02000503020000020003" pitchFamily="2" charset="0"/>
-              </a:rPr>
-              <a:t>Methods</a:t>
-            </a:r>
-          </a:p>
-        </p:txBody>
-      </p:sp>
-      <p:sp>
-        <p:nvSpPr>
-          <p:cNvPr id="4" name="TextBox 3">
-            <a:extLst>
-              <a:ext uri="{FF2B5EF4-FFF2-40B4-BE49-F238E27FC236}">
-                <a16:creationId xmlns:a16="http://schemas.microsoft.com/office/drawing/2014/main" id="{3B7DA52B-05E9-588C-C077-5D08D14E7F34}"/>
-              </a:ext>
-            </a:extLst>
-          </p:cNvPr>
-          <p:cNvSpPr txBox="1"/>
-          <p:nvPr/>
-        </p:nvSpPr>
-        <p:spPr>
-          <a:xfrm>
-            <a:off x="3123210" y="1611751"/>
-            <a:ext cx="1717962" cy="461665"/>
-          </a:xfrm>
-          <a:prstGeom prst="rect">
-            <a:avLst/>
-          </a:prstGeom>
-          <a:solidFill>
-            <a:schemeClr val="bg1"/>
-          </a:solidFill>
-        </p:spPr>
-        <p:txBody>
-          <a:bodyPr wrap="square" rtlCol="0">
-            <a:spAutoFit/>
-          </a:bodyPr>
-          <a:lstStyle/>
-          <a:p>
-            <a:r>
-              <a:rPr lang="en-US" sz="2400" b="1" dirty="0">
-                <a:solidFill>
-                  <a:srgbClr val="5EBB78"/>
-                </a:solidFill>
-                <a:latin typeface="Avenir Black" panose="02000503020000020003" pitchFamily="2" charset="0"/>
-              </a:rPr>
-              <a:t>Class</a:t>
-            </a:r>
-          </a:p>
-        </p:txBody>
-      </p:sp>
-      <p:sp>
-        <p:nvSpPr>
-          <p:cNvPr id="6" name="TextBox 5">
-            <a:extLst>
-              <a:ext uri="{FF2B5EF4-FFF2-40B4-BE49-F238E27FC236}">
-                <a16:creationId xmlns:a16="http://schemas.microsoft.com/office/drawing/2014/main" id="{0CBA5936-902D-6CF6-3925-A508B5B002A8}"/>
-              </a:ext>
-            </a:extLst>
-          </p:cNvPr>
-          <p:cNvSpPr txBox="1"/>
-          <p:nvPr/>
-        </p:nvSpPr>
-        <p:spPr>
-          <a:xfrm>
-            <a:off x="3323112" y="4844188"/>
-            <a:ext cx="1553686" cy="461665"/>
-          </a:xfrm>
-          <a:prstGeom prst="rect">
-            <a:avLst/>
-          </a:prstGeom>
-          <a:solidFill>
-            <a:schemeClr val="bg1"/>
-          </a:solidFill>
-        </p:spPr>
-        <p:txBody>
-          <a:bodyPr wrap="square" rtlCol="0">
-            <a:spAutoFit/>
-          </a:bodyPr>
-          <a:lstStyle/>
-          <a:p>
-            <a:r>
-              <a:rPr lang="en-US" sz="2400" b="1" dirty="0">
-                <a:solidFill>
-                  <a:srgbClr val="5EBB78"/>
-                </a:solidFill>
-                <a:latin typeface="Avenir Black" panose="02000503020000020003" pitchFamily="2" charset="0"/>
-              </a:rPr>
-              <a:t>Object</a:t>
-            </a:r>
-          </a:p>
-        </p:txBody>
-      </p:sp>
-      <p:sp>
-        <p:nvSpPr>
-          <p:cNvPr id="10" name="Rectangle 9">
-            <a:extLst>
-              <a:ext uri="{FF2B5EF4-FFF2-40B4-BE49-F238E27FC236}">
-                <a16:creationId xmlns:a16="http://schemas.microsoft.com/office/drawing/2014/main" id="{D12F0193-6F60-DE44-B69D-3EF04524479A}"/>
-              </a:ext>
-            </a:extLst>
-          </p:cNvPr>
-          <p:cNvSpPr/>
-          <p:nvPr/>
-        </p:nvSpPr>
-        <p:spPr>
-          <a:xfrm>
-            <a:off x="3679546" y="3879342"/>
-            <a:ext cx="380390" cy="767825"/>
-          </a:xfrm>
-          <a:prstGeom prst="rect">
-            <a:avLst/>
-          </a:prstGeom>
-          <a:solidFill>
-            <a:schemeClr val="bg1"/>
-          </a:solidFill>
-          <a:ln>
-            <a:noFill/>
-          </a:ln>
-        </p:spPr>
-        <p:style>
-          <a:lnRef idx="2">
-            <a:schemeClr val="accent1">
-              <a:shade val="50000"/>
-            </a:schemeClr>
-          </a:lnRef>
-          <a:fillRef idx="1">
-            <a:schemeClr val="accent1"/>
-          </a:fillRef>
-          <a:effectRef idx="0">
-            <a:schemeClr val="accent1"/>
-          </a:effectRef>
-          <a:fontRef idx="minor">
-            <a:schemeClr val="lt1"/>
-          </a:fontRef>
-        </p:style>
-        <p:txBody>
-          <a:bodyPr rtlCol="0" anchor="ctr"/>
-          <a:lstStyle/>
-          <a:p>
-            <a:pPr algn="ctr"/>
-            <a:endParaRPr lang="en-US"/>
-          </a:p>
-        </p:txBody>
-      </p:sp>
-      <p:cxnSp>
-        <p:nvCxnSpPr>
-          <p:cNvPr id="8" name="Straight Arrow Connector 7">
-            <a:extLst>
-              <a:ext uri="{FF2B5EF4-FFF2-40B4-BE49-F238E27FC236}">
-                <a16:creationId xmlns:a16="http://schemas.microsoft.com/office/drawing/2014/main" id="{71CAB373-C399-6279-E3B1-3B40696DF9EF}"/>
-              </a:ext>
-            </a:extLst>
-          </p:cNvPr>
-          <p:cNvCxnSpPr>
-            <a:cxnSpLocks/>
-          </p:cNvCxnSpPr>
-          <p:nvPr/>
-        </p:nvCxnSpPr>
-        <p:spPr>
-          <a:xfrm flipH="1" flipV="1">
-            <a:off x="3789274" y="3994099"/>
-            <a:ext cx="80467" cy="780703"/>
-          </a:xfrm>
-          <a:prstGeom prst="straightConnector1">
-            <a:avLst/>
-          </a:prstGeom>
-          <a:ln w="101600" cap="rnd">
-            <a:solidFill>
-              <a:srgbClr val="5EBB78"/>
-            </a:solidFill>
-            <a:tailEnd type="triangle"/>
-          </a:ln>
-        </p:spPr>
-        <p:style>
-          <a:lnRef idx="1">
-            <a:schemeClr val="accent1"/>
-          </a:lnRef>
-          <a:fillRef idx="0">
-            <a:schemeClr val="accent1"/>
-          </a:fillRef>
-          <a:effectRef idx="0">
-            <a:schemeClr val="accent1"/>
-          </a:effectRef>
-          <a:fontRef idx="minor">
-            <a:schemeClr val="tx1"/>
-          </a:fontRef>
-        </p:style>
-      </p:cxnSp>
-      <p:cxnSp>
-        <p:nvCxnSpPr>
-          <p:cNvPr id="13" name="Straight Arrow Connector 12">
-            <a:extLst>
-              <a:ext uri="{FF2B5EF4-FFF2-40B4-BE49-F238E27FC236}">
-                <a16:creationId xmlns:a16="http://schemas.microsoft.com/office/drawing/2014/main" id="{EC7D8FE8-94E0-77F2-435D-5401038A9125}"/>
-              </a:ext>
-            </a:extLst>
-          </p:cNvPr>
-          <p:cNvCxnSpPr>
-            <a:cxnSpLocks/>
-          </p:cNvCxnSpPr>
-          <p:nvPr/>
-        </p:nvCxnSpPr>
-        <p:spPr>
-          <a:xfrm>
-            <a:off x="4099955" y="1842583"/>
-            <a:ext cx="741217" cy="86578"/>
-          </a:xfrm>
-          <a:prstGeom prst="straightConnector1">
-            <a:avLst/>
-          </a:prstGeom>
-          <a:ln w="101600" cap="rnd">
-            <a:solidFill>
-              <a:srgbClr val="5EBB78"/>
-            </a:solidFill>
-            <a:tailEnd type="triangle"/>
-          </a:ln>
-        </p:spPr>
-        <p:style>
-          <a:lnRef idx="1">
-            <a:schemeClr val="accent1"/>
-          </a:lnRef>
-          <a:fillRef idx="0">
-            <a:schemeClr val="accent1"/>
-          </a:fillRef>
-          <a:effectRef idx="0">
-            <a:schemeClr val="accent1"/>
-          </a:effectRef>
-          <a:fontRef idx="minor">
-            <a:schemeClr val="tx1"/>
-          </a:fontRef>
-        </p:style>
-      </p:cxnSp>
-      <p:sp>
-        <p:nvSpPr>
-          <p:cNvPr id="26" name="Rectangle 25">
-            <a:extLst>
-              <a:ext uri="{FF2B5EF4-FFF2-40B4-BE49-F238E27FC236}">
-                <a16:creationId xmlns:a16="http://schemas.microsoft.com/office/drawing/2014/main" id="{B7DB4681-30BC-7631-77A8-5051FE716D58}"/>
-              </a:ext>
-            </a:extLst>
-          </p:cNvPr>
-          <p:cNvSpPr/>
-          <p:nvPr/>
-        </p:nvSpPr>
-        <p:spPr>
-          <a:xfrm>
-            <a:off x="7594636" y="2382880"/>
-            <a:ext cx="506224" cy="2565638"/>
-          </a:xfrm>
-          <a:prstGeom prst="rect">
-            <a:avLst/>
-          </a:prstGeom>
-          <a:solidFill>
-            <a:schemeClr val="bg1"/>
-          </a:solidFill>
-          <a:ln>
-            <a:noFill/>
-          </a:ln>
-        </p:spPr>
-        <p:style>
-          <a:lnRef idx="2">
-            <a:schemeClr val="accent1">
-              <a:shade val="50000"/>
-            </a:schemeClr>
-          </a:lnRef>
-          <a:fillRef idx="1">
-            <a:schemeClr val="accent1"/>
-          </a:fillRef>
-          <a:effectRef idx="0">
-            <a:schemeClr val="accent1"/>
-          </a:effectRef>
-          <a:fontRef idx="minor">
-            <a:schemeClr val="lt1"/>
-          </a:fontRef>
-        </p:style>
-        <p:txBody>
-          <a:bodyPr rtlCol="0" anchor="ctr"/>
-          <a:lstStyle/>
-          <a:p>
-            <a:pPr algn="ctr"/>
-            <a:endParaRPr lang="en-US"/>
-          </a:p>
-        </p:txBody>
-      </p:sp>
-      <p:cxnSp>
-        <p:nvCxnSpPr>
-          <p:cNvPr id="16" name="Straight Arrow Connector 15">
-            <a:extLst>
-              <a:ext uri="{FF2B5EF4-FFF2-40B4-BE49-F238E27FC236}">
-                <a16:creationId xmlns:a16="http://schemas.microsoft.com/office/drawing/2014/main" id="{DF5A80FF-03E1-09B2-3787-F8F8A45F8850}"/>
-              </a:ext>
-            </a:extLst>
-          </p:cNvPr>
-          <p:cNvCxnSpPr>
-            <a:cxnSpLocks/>
-          </p:cNvCxnSpPr>
-          <p:nvPr/>
-        </p:nvCxnSpPr>
-        <p:spPr>
-          <a:xfrm flipH="1" flipV="1">
-            <a:off x="7594636" y="2434829"/>
-            <a:ext cx="491306" cy="256561"/>
-          </a:xfrm>
-          <a:prstGeom prst="straightConnector1">
-            <a:avLst/>
-          </a:prstGeom>
-          <a:ln w="82550" cap="rnd">
-            <a:solidFill>
-              <a:srgbClr val="5EBB78"/>
-            </a:solidFill>
-            <a:tailEnd type="triangle"/>
-          </a:ln>
-        </p:spPr>
-        <p:style>
-          <a:lnRef idx="1">
-            <a:schemeClr val="accent1"/>
-          </a:lnRef>
-          <a:fillRef idx="0">
-            <a:schemeClr val="accent1"/>
-          </a:fillRef>
-          <a:effectRef idx="0">
-            <a:schemeClr val="accent1"/>
-          </a:effectRef>
-          <a:fontRef idx="minor">
-            <a:schemeClr val="tx1"/>
-          </a:fontRef>
-        </p:style>
-      </p:cxnSp>
-      <p:cxnSp>
-        <p:nvCxnSpPr>
-          <p:cNvPr id="19" name="Straight Arrow Connector 18">
-            <a:extLst>
-              <a:ext uri="{FF2B5EF4-FFF2-40B4-BE49-F238E27FC236}">
-                <a16:creationId xmlns:a16="http://schemas.microsoft.com/office/drawing/2014/main" id="{1EDBC4FC-E2F9-9E9B-13E4-1F09496F6B22}"/>
-              </a:ext>
-            </a:extLst>
-          </p:cNvPr>
-          <p:cNvCxnSpPr>
-            <a:cxnSpLocks/>
-          </p:cNvCxnSpPr>
-          <p:nvPr/>
-        </p:nvCxnSpPr>
-        <p:spPr>
-          <a:xfrm flipH="1">
-            <a:off x="7594636" y="2922222"/>
-            <a:ext cx="444020" cy="0"/>
-          </a:xfrm>
-          <a:prstGeom prst="straightConnector1">
-            <a:avLst/>
-          </a:prstGeom>
-          <a:ln w="82550" cap="rnd">
-            <a:solidFill>
-              <a:srgbClr val="5EBB78"/>
-            </a:solidFill>
-            <a:tailEnd type="triangle"/>
-          </a:ln>
-        </p:spPr>
-        <p:style>
-          <a:lnRef idx="1">
-            <a:schemeClr val="accent1"/>
-          </a:lnRef>
-          <a:fillRef idx="0">
-            <a:schemeClr val="accent1"/>
-          </a:fillRef>
-          <a:effectRef idx="0">
-            <a:schemeClr val="accent1"/>
-          </a:effectRef>
-          <a:fontRef idx="minor">
-            <a:schemeClr val="tx1"/>
-          </a:fontRef>
-        </p:style>
-      </p:cxnSp>
-      <p:cxnSp>
-        <p:nvCxnSpPr>
-          <p:cNvPr id="21" name="Straight Arrow Connector 20">
-            <a:extLst>
-              <a:ext uri="{FF2B5EF4-FFF2-40B4-BE49-F238E27FC236}">
-                <a16:creationId xmlns:a16="http://schemas.microsoft.com/office/drawing/2014/main" id="{A76F4335-F87A-E57C-1BAF-A8BCE40F55C1}"/>
-              </a:ext>
-            </a:extLst>
-          </p:cNvPr>
-          <p:cNvCxnSpPr>
-            <a:cxnSpLocks/>
-          </p:cNvCxnSpPr>
-          <p:nvPr/>
-        </p:nvCxnSpPr>
-        <p:spPr>
-          <a:xfrm flipH="1">
-            <a:off x="7638881" y="3120335"/>
-            <a:ext cx="407234" cy="276297"/>
-          </a:xfrm>
-          <a:prstGeom prst="straightConnector1">
-            <a:avLst/>
-          </a:prstGeom>
-          <a:ln w="82550" cap="rnd">
-            <a:solidFill>
-              <a:srgbClr val="5EBB78"/>
-            </a:solidFill>
-            <a:tailEnd type="triangle"/>
-          </a:ln>
-        </p:spPr>
-        <p:style>
-          <a:lnRef idx="1">
-            <a:schemeClr val="accent1"/>
-          </a:lnRef>
-          <a:fillRef idx="0">
-            <a:schemeClr val="accent1"/>
-          </a:fillRef>
-          <a:effectRef idx="0">
-            <a:schemeClr val="accent1"/>
-          </a:effectRef>
-          <a:fontRef idx="minor">
-            <a:schemeClr val="tx1"/>
-          </a:fontRef>
-        </p:style>
-      </p:cxnSp>
-      <p:cxnSp>
-        <p:nvCxnSpPr>
-          <p:cNvPr id="23" name="Straight Arrow Connector 22">
-            <a:extLst>
-              <a:ext uri="{FF2B5EF4-FFF2-40B4-BE49-F238E27FC236}">
-                <a16:creationId xmlns:a16="http://schemas.microsoft.com/office/drawing/2014/main" id="{AA66E497-34CF-BEBB-32EA-77CDE6BA3FEB}"/>
-              </a:ext>
-            </a:extLst>
-          </p:cNvPr>
-          <p:cNvCxnSpPr>
-            <a:cxnSpLocks/>
-          </p:cNvCxnSpPr>
-          <p:nvPr/>
-        </p:nvCxnSpPr>
-        <p:spPr>
-          <a:xfrm flipH="1" flipV="1">
-            <a:off x="7594636" y="3882114"/>
-            <a:ext cx="491306" cy="256561"/>
-          </a:xfrm>
-          <a:prstGeom prst="straightConnector1">
-            <a:avLst/>
-          </a:prstGeom>
-          <a:ln w="82550" cap="rnd">
-            <a:solidFill>
-              <a:srgbClr val="5EBB78"/>
-            </a:solidFill>
-            <a:tailEnd type="triangle"/>
-          </a:ln>
-        </p:spPr>
-        <p:style>
-          <a:lnRef idx="1">
-            <a:schemeClr val="accent1"/>
-          </a:lnRef>
-          <a:fillRef idx="0">
-            <a:schemeClr val="accent1"/>
-          </a:fillRef>
-          <a:effectRef idx="0">
-            <a:schemeClr val="accent1"/>
-          </a:effectRef>
-          <a:fontRef idx="minor">
-            <a:schemeClr val="tx1"/>
-          </a:fontRef>
-        </p:style>
-      </p:cxnSp>
-      <p:cxnSp>
-        <p:nvCxnSpPr>
-          <p:cNvPr id="24" name="Straight Arrow Connector 23">
-            <a:extLst>
-              <a:ext uri="{FF2B5EF4-FFF2-40B4-BE49-F238E27FC236}">
-                <a16:creationId xmlns:a16="http://schemas.microsoft.com/office/drawing/2014/main" id="{53AC70BA-59E7-6518-F452-822CCDEBB417}"/>
-              </a:ext>
-            </a:extLst>
-          </p:cNvPr>
-          <p:cNvCxnSpPr>
-            <a:cxnSpLocks/>
-          </p:cNvCxnSpPr>
-          <p:nvPr/>
-        </p:nvCxnSpPr>
-        <p:spPr>
-          <a:xfrm flipH="1">
-            <a:off x="7594636" y="4369507"/>
-            <a:ext cx="444020" cy="0"/>
-          </a:xfrm>
-          <a:prstGeom prst="straightConnector1">
-            <a:avLst/>
-          </a:prstGeom>
-          <a:ln w="82550" cap="rnd">
-            <a:solidFill>
-              <a:srgbClr val="5EBB78"/>
-            </a:solidFill>
-            <a:tailEnd type="triangle"/>
-          </a:ln>
-        </p:spPr>
-        <p:style>
-          <a:lnRef idx="1">
-            <a:schemeClr val="accent1"/>
-          </a:lnRef>
-          <a:fillRef idx="0">
-            <a:schemeClr val="accent1"/>
-          </a:fillRef>
-          <a:effectRef idx="0">
-            <a:schemeClr val="accent1"/>
-          </a:effectRef>
-          <a:fontRef idx="minor">
-            <a:schemeClr val="tx1"/>
-          </a:fontRef>
-        </p:style>
-      </p:cxnSp>
-      <p:cxnSp>
-        <p:nvCxnSpPr>
-          <p:cNvPr id="25" name="Straight Arrow Connector 24">
-            <a:extLst>
-              <a:ext uri="{FF2B5EF4-FFF2-40B4-BE49-F238E27FC236}">
-                <a16:creationId xmlns:a16="http://schemas.microsoft.com/office/drawing/2014/main" id="{F0286BAC-47A9-32A7-8F0B-086EF1B10152}"/>
-              </a:ext>
-            </a:extLst>
-          </p:cNvPr>
-          <p:cNvCxnSpPr>
-            <a:cxnSpLocks/>
-          </p:cNvCxnSpPr>
-          <p:nvPr/>
-        </p:nvCxnSpPr>
-        <p:spPr>
-          <a:xfrm flipH="1">
-            <a:off x="7638881" y="4567620"/>
-            <a:ext cx="407234" cy="276297"/>
-          </a:xfrm>
-          <a:prstGeom prst="straightConnector1">
-            <a:avLst/>
-          </a:prstGeom>
-          <a:ln w="82550" cap="rnd">
-            <a:solidFill>
-              <a:srgbClr val="5EBB78"/>
-            </a:solidFill>
-            <a:tailEnd type="triangle"/>
-          </a:ln>
-        </p:spPr>
-        <p:style>
-          <a:lnRef idx="1">
-            <a:schemeClr val="accent1"/>
-          </a:lnRef>
-          <a:fillRef idx="0">
-            <a:schemeClr val="accent1"/>
-          </a:fillRef>
-          <a:effectRef idx="0">
-            <a:schemeClr val="accent1"/>
-          </a:effectRef>
-          <a:fontRef idx="minor">
-            <a:schemeClr val="tx1"/>
-          </a:fontRef>
-        </p:style>
-      </p:cxnSp>
       <p:pic>
         <p:nvPicPr>
-          <p:cNvPr id="27" name="Picture 26" descr="A picture containing dark, gauge&#10;&#10;Description automatically generated">
-            <a:extLst>
-              <a:ext uri="{FF2B5EF4-FFF2-40B4-BE49-F238E27FC236}">
-                <a16:creationId xmlns:a16="http://schemas.microsoft.com/office/drawing/2014/main" id="{87B9CA08-6B59-4E08-094B-C1695054764E}"/>
+          <p:cNvPr id="6" name="Picture 5" descr="A picture containing dark, gauge&#10;&#10;Description automatically generated">
+            <a:extLst>
+              <a:ext uri="{FF2B5EF4-FFF2-40B4-BE49-F238E27FC236}">
+                <a16:creationId xmlns:a16="http://schemas.microsoft.com/office/drawing/2014/main" id="{F9D0A188-A97D-DF1B-FA96-7D019CD5C170}"/>
               </a:ext>
             </a:extLst>
           </p:cNvPr>
@@ -9670,15 +9062,6 @@
         <p:blipFill>
           <a:blip r:embed="rId4">
             <a:extLst>
-              <a:ext uri="{BEBA8EAE-BF5A-486C-A8C5-ECC9F3942E4B}">
-                <a14:imgProps xmlns:a14="http://schemas.microsoft.com/office/drawing/2010/main">
-                  <a14:imgLayer r:embed="rId5">
-                    <a14:imgEffect>
-                      <a14:brightnessContrast bright="20000" contrast="40000"/>
-                    </a14:imgEffect>
-                  </a14:imgLayer>
-                </a14:imgProps>
-              </a:ext>
               <a:ext uri="{28A0092B-C50C-407E-A947-70E740481C1C}">
                 <a14:useLocalDpi xmlns:a14="http://schemas.microsoft.com/office/drawing/2010/main" val="0"/>
               </a:ext>
@@ -9690,7 +9073,7 @@
         </p:blipFill>
         <p:spPr>
           <a:xfrm>
-            <a:off x="11378037" y="6031948"/>
+            <a:off x="11378037" y="6045200"/>
             <a:ext cx="800100" cy="812800"/>
           </a:xfrm>
           <a:prstGeom prst="rect">
@@ -9798,10 +9181,10 @@
       </p:sp>
       <p:pic>
         <p:nvPicPr>
-          <p:cNvPr id="23" name="Picture 22" descr="A picture containing dark, gauge&#10;&#10;Description automatically generated">
-            <a:extLst>
-              <a:ext uri="{FF2B5EF4-FFF2-40B4-BE49-F238E27FC236}">
-                <a16:creationId xmlns:a16="http://schemas.microsoft.com/office/drawing/2014/main" id="{B4A1F0E0-AE0C-26DA-8B71-9B6B59FE9E0D}"/>
+          <p:cNvPr id="2" name="Picture 1">
+            <a:extLst>
+              <a:ext uri="{FF2B5EF4-FFF2-40B4-BE49-F238E27FC236}">
+                <a16:creationId xmlns:a16="http://schemas.microsoft.com/office/drawing/2014/main" id="{C6A4991D-3279-E683-3BA9-4325D79B8300}"/>
               </a:ext>
             </a:extLst>
           </p:cNvPr>
@@ -9811,30 +9194,15 @@
           <p:nvPr/>
         </p:nvPicPr>
         <p:blipFill>
-          <a:blip r:embed="rId3">
-            <a:extLst>
-              <a:ext uri="{BEBA8EAE-BF5A-486C-A8C5-ECC9F3942E4B}">
-                <a14:imgProps xmlns:a14="http://schemas.microsoft.com/office/drawing/2010/main">
-                  <a14:imgLayer r:embed="rId4">
-                    <a14:imgEffect>
-                      <a14:brightnessContrast bright="20000" contrast="40000"/>
-                    </a14:imgEffect>
-                  </a14:imgLayer>
-                </a14:imgProps>
-              </a:ext>
-              <a:ext uri="{28A0092B-C50C-407E-A947-70E740481C1C}">
-                <a14:useLocalDpi xmlns:a14="http://schemas.microsoft.com/office/drawing/2010/main" val="0"/>
-              </a:ext>
-            </a:extLst>
-          </a:blip>
+          <a:blip r:embed="rId3"/>
           <a:stretch>
             <a:fillRect/>
           </a:stretch>
         </p:blipFill>
         <p:spPr>
           <a:xfrm>
-            <a:off x="11378037" y="6031948"/>
-            <a:ext cx="800100" cy="812800"/>
+            <a:off x="3239943" y="930563"/>
+            <a:ext cx="5712114" cy="4569691"/>
           </a:xfrm>
           <a:prstGeom prst="rect">
             <a:avLst/>
@@ -9843,49 +9211,38 @@
       </p:pic>
       <p:pic>
         <p:nvPicPr>
-          <p:cNvPr id="14" name="Picture 2" descr="PHP Inheritance">
-            <a:extLst>
-              <a:ext uri="{FF2B5EF4-FFF2-40B4-BE49-F238E27FC236}">
-                <a16:creationId xmlns:a16="http://schemas.microsoft.com/office/drawing/2014/main" id="{E357B7C1-A70F-9038-B89F-856211EA78E1}"/>
+          <p:cNvPr id="5" name="Picture 4" descr="A picture containing dark, gauge&#10;&#10;Description automatically generated">
+            <a:extLst>
+              <a:ext uri="{FF2B5EF4-FFF2-40B4-BE49-F238E27FC236}">
+                <a16:creationId xmlns:a16="http://schemas.microsoft.com/office/drawing/2014/main" id="{F652B3EB-A3A0-F53E-066E-99238E8F6D92}"/>
               </a:ext>
             </a:extLst>
           </p:cNvPr>
           <p:cNvPicPr>
-            <a:picLocks noChangeAspect="1" noChangeArrowheads="1"/>
+            <a:picLocks noChangeAspect="1"/>
           </p:cNvPicPr>
           <p:nvPr/>
         </p:nvPicPr>
         <p:blipFill>
-          <a:blip r:embed="rId5">
+          <a:blip r:embed="rId4">
             <a:extLst>
               <a:ext uri="{28A0092B-C50C-407E-A947-70E740481C1C}">
                 <a14:useLocalDpi xmlns:a14="http://schemas.microsoft.com/office/drawing/2010/main" val="0"/>
               </a:ext>
             </a:extLst>
           </a:blip>
-          <a:srcRect/>
           <a:stretch>
             <a:fillRect/>
           </a:stretch>
         </p:blipFill>
-        <p:spPr bwMode="auto">
+        <p:spPr>
           <a:xfrm>
-            <a:off x="3381375" y="1257300"/>
-            <a:ext cx="5429250" cy="4343400"/>
+            <a:off x="11378037" y="6045200"/>
+            <a:ext cx="800100" cy="812800"/>
           </a:xfrm>
           <a:prstGeom prst="rect">
             <a:avLst/>
           </a:prstGeom>
-          <a:noFill/>
-          <a:extLst>
-            <a:ext uri="{909E8E84-426E-40DD-AFC4-6F175D3DCCD1}">
-              <a14:hiddenFill xmlns:a14="http://schemas.microsoft.com/office/drawing/2010/main">
-                <a:solidFill>
-                  <a:srgbClr val="FFFFFF"/>
-                </a:solidFill>
-              </a14:hiddenFill>
-            </a:ext>
-          </a:extLst>
         </p:spPr>
       </p:pic>
     </p:spTree>
@@ -9919,7 +9276,7 @@
     <p:bg>
       <p:bgPr>
         <a:solidFill>
-          <a:srgbClr val="6E61BA"/>
+          <a:srgbClr val="5A5AA8"/>
         </a:solidFill>
         <a:effectLst/>
       </p:bgPr>
@@ -9956,7 +9313,7 @@
         </p:nvSpPr>
         <p:spPr>
           <a:xfrm>
-            <a:off x="838200" y="1003003"/>
+            <a:off x="838200" y="1183112"/>
             <a:ext cx="10515600" cy="5551714"/>
           </a:xfrm>
         </p:spPr>
@@ -10146,25 +9503,23 @@
                 </a:solidFill>
                 <a:latin typeface="Avenir" panose="02000503020000020003" pitchFamily="2" charset="0"/>
               </a:rPr>
-              <a:t>				              </a:t>
-            </a:r>
-          </a:p>
-          <a:p>
-            <a:pPr marL="0" indent="0" algn="ctr">
-              <a:lnSpc>
-                <a:spcPct val="120000"/>
-              </a:lnSpc>
-              <a:buNone/>
-            </a:pPr>
-            <a:r>
-              <a:rPr lang="en-US" sz="2400" dirty="0">
+              <a:t>				                                  </a:t>
+            </a:r>
+            <a:r>
+              <a:rPr lang="en-US" sz="1800" dirty="0">
                 <a:solidFill>
                   <a:schemeClr val="bg1"/>
                 </a:solidFill>
                 <a:latin typeface="Avenir" panose="02000503020000020003" pitchFamily="2" charset="0"/>
               </a:rPr>
-              <a:t>					  		John Zelle</a:t>
-            </a:r>
+              <a:t>John Zelle</a:t>
+            </a:r>
+            <a:endParaRPr lang="en-US" sz="2400" dirty="0">
+              <a:solidFill>
+                <a:schemeClr val="bg1"/>
+              </a:solidFill>
+              <a:latin typeface="Avenir" panose="02000503020000020003" pitchFamily="2" charset="0"/>
+            </a:endParaRPr>
           </a:p>
           <a:p>
             <a:pPr marL="0" indent="0">
@@ -10184,10 +9539,10 @@
       </p:sp>
       <p:pic>
         <p:nvPicPr>
-          <p:cNvPr id="4" name="Picture 3" descr="A picture containing dark, gauge&#10;&#10;Description automatically generated">
-            <a:extLst>
-              <a:ext uri="{FF2B5EF4-FFF2-40B4-BE49-F238E27FC236}">
-                <a16:creationId xmlns:a16="http://schemas.microsoft.com/office/drawing/2014/main" id="{4692A2D3-EE2B-5092-AB65-5C1ADCB6EEA4}"/>
+          <p:cNvPr id="5" name="Picture 4" descr="A picture containing dark, gauge&#10;&#10;Description automatically generated">
+            <a:extLst>
+              <a:ext uri="{FF2B5EF4-FFF2-40B4-BE49-F238E27FC236}">
+                <a16:creationId xmlns:a16="http://schemas.microsoft.com/office/drawing/2014/main" id="{09731AEF-C8DE-26ED-75BD-5EEF5DCBE328}"/>
               </a:ext>
             </a:extLst>
           </p:cNvPr>
@@ -10199,15 +9554,6 @@
         <p:blipFill>
           <a:blip r:embed="rId3">
             <a:extLst>
-              <a:ext uri="{BEBA8EAE-BF5A-486C-A8C5-ECC9F3942E4B}">
-                <a14:imgProps xmlns:a14="http://schemas.microsoft.com/office/drawing/2010/main">
-                  <a14:imgLayer r:embed="rId4">
-                    <a14:imgEffect>
-                      <a14:brightnessContrast bright="20000" contrast="40000"/>
-                    </a14:imgEffect>
-                  </a14:imgLayer>
-                </a14:imgProps>
-              </a:ext>
               <a:ext uri="{28A0092B-C50C-407E-A947-70E740481C1C}">
                 <a14:useLocalDpi xmlns:a14="http://schemas.microsoft.com/office/drawing/2010/main" val="0"/>
               </a:ext>
@@ -10219,7 +9565,7 @@
         </p:blipFill>
         <p:spPr>
           <a:xfrm>
-            <a:off x="11378037" y="6031948"/>
+            <a:off x="11378037" y="6045200"/>
             <a:ext cx="800100" cy="812800"/>
           </a:xfrm>
           <a:prstGeom prst="rect">
@@ -10300,9 +9646,8 @@
             <a:r>
               <a:rPr lang="en-US" sz="3600" b="1" dirty="0">
                 <a:solidFill>
-                  <a:schemeClr val="tx1">
-                    <a:lumMod val="65000"/>
-                    <a:lumOff val="35000"/>
+                  <a:schemeClr val="bg2">
+                    <a:lumMod val="25000"/>
                   </a:schemeClr>
                 </a:solidFill>
                 <a:latin typeface="Avenir Black" panose="02000503020000020003" pitchFamily="2" charset="0"/>
@@ -10312,9 +9657,8 @@
             </a:r>
             <a:endParaRPr lang="en-US" sz="3600" b="1" dirty="0">
               <a:solidFill>
-                <a:schemeClr val="tx1">
-                  <a:lumMod val="65000"/>
-                  <a:lumOff val="35000"/>
+                <a:schemeClr val="bg2">
+                  <a:lumMod val="25000"/>
                 </a:schemeClr>
               </a:solidFill>
               <a:latin typeface="Avenir Black" panose="02000503020000020003" pitchFamily="2" charset="0"/>
@@ -10364,7 +9708,7 @@
             <a:r>
               <a:rPr lang="en-US" sz="2800" u="sng" dirty="0">
                 <a:solidFill>
-                  <a:srgbClr val="5EBB78"/>
+                  <a:srgbClr val="5A5AA8"/>
                 </a:solidFill>
                 <a:latin typeface="Avenir" panose="02000503020000020003" pitchFamily="2" charset="0"/>
                 <a:cs typeface="Futura Medium" panose="020B0602020204020303"/>
@@ -10524,7 +9868,7 @@
         <p:spPr>
           <a:xfrm>
             <a:off x="984504" y="3923592"/>
-            <a:ext cx="10430256" cy="1815882"/>
+            <a:ext cx="10430256" cy="1384995"/>
           </a:xfrm>
           <a:prstGeom prst="rect">
             <a:avLst/>
@@ -10556,7 +9900,7 @@
                 <a:latin typeface="Avenir" panose="02000503020000020003" pitchFamily="2" charset="0"/>
                 <a:cs typeface="Futura Medium" panose="020B0602020204020303"/>
               </a:rPr>
-              <a:t>e.g. </a:t>
+              <a:t>i.e., </a:t>
             </a:r>
             <a:r>
               <a:rPr lang="en-US" sz="2800" dirty="0">
@@ -10717,7 +10061,7 @@
           <p:cNvPr id="15" name="Picture 14" descr="A picture containing dark, gauge&#10;&#10;Description automatically generated">
             <a:extLst>
               <a:ext uri="{FF2B5EF4-FFF2-40B4-BE49-F238E27FC236}">
-                <a16:creationId xmlns:a16="http://schemas.microsoft.com/office/drawing/2014/main" id="{7DE661C6-1282-0617-8149-16EEDB35EADB}"/>
+                <a16:creationId xmlns:a16="http://schemas.microsoft.com/office/drawing/2014/main" id="{C2690AFE-6FD7-643A-6EDE-1B57C956A15B}"/>
               </a:ext>
             </a:extLst>
           </p:cNvPr>
@@ -11058,10 +10402,7 @@
             <a:r>
               <a:rPr lang="en-US" sz="3600" b="1" dirty="0">
                 <a:solidFill>
-                  <a:schemeClr val="tx1">
-                    <a:lumMod val="65000"/>
-                    <a:lumOff val="35000"/>
-                  </a:schemeClr>
+                  <a:srgbClr val="30335D"/>
                 </a:solidFill>
                 <a:latin typeface="Avenir Heavy" panose="02000503020000020003" pitchFamily="2" charset="0"/>
                 <a:cs typeface="Arial" panose="020B0604020202020204" pitchFamily="34" charset="0"/>
@@ -11070,10 +10411,7 @@
             </a:r>
             <a:endParaRPr lang="en-US" sz="3600" b="1" dirty="0">
               <a:solidFill>
-                <a:schemeClr val="tx1">
-                  <a:lumMod val="65000"/>
-                  <a:lumOff val="35000"/>
-                </a:schemeClr>
+                <a:srgbClr val="30335D"/>
               </a:solidFill>
               <a:latin typeface="Avenir Heavy" panose="02000503020000020003" pitchFamily="2" charset="0"/>
             </a:endParaRPr>
@@ -11138,10 +10476,10 @@
       </p:sp>
       <p:grpSp>
         <p:nvGrpSpPr>
-          <p:cNvPr id="31" name="Group 30">
-            <a:extLst>
-              <a:ext uri="{FF2B5EF4-FFF2-40B4-BE49-F238E27FC236}">
-                <a16:creationId xmlns:a16="http://schemas.microsoft.com/office/drawing/2014/main" id="{00470190-8E4E-88C5-EAAA-757592483B62}"/>
+          <p:cNvPr id="2" name="Group 1">
+            <a:extLst>
+              <a:ext uri="{FF2B5EF4-FFF2-40B4-BE49-F238E27FC236}">
+                <a16:creationId xmlns:a16="http://schemas.microsoft.com/office/drawing/2014/main" id="{6C5D0102-34E4-40E9-EE83-8E7179C932E2}"/>
               </a:ext>
             </a:extLst>
           </p:cNvPr>
@@ -11150,7 +10488,7 @@
         </p:nvGrpSpPr>
         <p:grpSpPr>
           <a:xfrm>
-            <a:off x="3288631" y="2743452"/>
+            <a:off x="3498831" y="2743452"/>
             <a:ext cx="5058572" cy="2059386"/>
             <a:chOff x="3498831" y="2743452"/>
             <a:chExt cx="5058572" cy="2059386"/>
@@ -11158,10 +10496,10 @@
         </p:grpSpPr>
         <p:cxnSp>
           <p:nvCxnSpPr>
-            <p:cNvPr id="29" name="Straight Connector 28">
+            <p:cNvPr id="3" name="Straight Connector 2">
               <a:extLst>
                 <a:ext uri="{FF2B5EF4-FFF2-40B4-BE49-F238E27FC236}">
-                  <a16:creationId xmlns:a16="http://schemas.microsoft.com/office/drawing/2014/main" id="{7058919D-B0BE-F74D-FE5C-B0989BFF877B}"/>
+                  <a16:creationId xmlns:a16="http://schemas.microsoft.com/office/drawing/2014/main" id="{EADFB7D8-755D-32DF-799A-CBBEA64D5E2A}"/>
                 </a:ext>
               </a:extLst>
             </p:cNvPr>
@@ -11201,10 +10539,10 @@
         </p:cxnSp>
         <p:cxnSp>
           <p:nvCxnSpPr>
-            <p:cNvPr id="28" name="Straight Connector 27">
+            <p:cNvPr id="4" name="Straight Connector 3">
               <a:extLst>
                 <a:ext uri="{FF2B5EF4-FFF2-40B4-BE49-F238E27FC236}">
-                  <a16:creationId xmlns:a16="http://schemas.microsoft.com/office/drawing/2014/main" id="{3DF63494-0FC0-4D5B-8638-B70E199592BB}"/>
+                  <a16:creationId xmlns:a16="http://schemas.microsoft.com/office/drawing/2014/main" id="{4FEA13FF-09C1-B530-A740-EFF84CDD320A}"/>
                 </a:ext>
               </a:extLst>
             </p:cNvPr>
@@ -11244,10 +10582,10 @@
         </p:cxnSp>
         <p:cxnSp>
           <p:nvCxnSpPr>
-            <p:cNvPr id="26" name="Straight Connector 25">
+            <p:cNvPr id="5" name="Straight Connector 4">
               <a:extLst>
                 <a:ext uri="{FF2B5EF4-FFF2-40B4-BE49-F238E27FC236}">
-                  <a16:creationId xmlns:a16="http://schemas.microsoft.com/office/drawing/2014/main" id="{12C6612B-5B99-113A-B44C-C0D7E037865C}"/>
+                  <a16:creationId xmlns:a16="http://schemas.microsoft.com/office/drawing/2014/main" id="{960D5735-EC15-9F98-BE5D-BBECABA9E89C}"/>
                 </a:ext>
               </a:extLst>
             </p:cNvPr>
@@ -11287,10 +10625,10 @@
         </p:cxnSp>
         <p:sp>
           <p:nvSpPr>
-            <p:cNvPr id="23" name="Left Bracket 22">
+            <p:cNvPr id="8" name="Left Bracket 7">
               <a:extLst>
                 <a:ext uri="{FF2B5EF4-FFF2-40B4-BE49-F238E27FC236}">
-                  <a16:creationId xmlns:a16="http://schemas.microsoft.com/office/drawing/2014/main" id="{9965E8DD-A696-D473-7CBC-D38B0487CD1F}"/>
+                  <a16:creationId xmlns:a16="http://schemas.microsoft.com/office/drawing/2014/main" id="{0DD81E97-7710-8C8F-D943-44CF1829AB35}"/>
                 </a:ext>
               </a:extLst>
             </p:cNvPr>
@@ -11342,10 +10680,10 @@
         </p:sp>
         <p:sp>
           <p:nvSpPr>
-            <p:cNvPr id="24" name="Left Bracket 23">
+            <p:cNvPr id="25" name="Left Bracket 24">
               <a:extLst>
                 <a:ext uri="{FF2B5EF4-FFF2-40B4-BE49-F238E27FC236}">
-                  <a16:creationId xmlns:a16="http://schemas.microsoft.com/office/drawing/2014/main" id="{1672C597-AECD-A9DB-F211-00B0F094832C}"/>
+                  <a16:creationId xmlns:a16="http://schemas.microsoft.com/office/drawing/2014/main" id="{C9D5DF46-BEB2-F226-C8C2-DB5F074C8D08}"/>
                 </a:ext>
               </a:extLst>
             </p:cNvPr>
@@ -11398,10 +10736,10 @@
       </p:grpSp>
       <p:sp>
         <p:nvSpPr>
-          <p:cNvPr id="21" name="Rounded Rectangle 20">
-            <a:extLst>
-              <a:ext uri="{FF2B5EF4-FFF2-40B4-BE49-F238E27FC236}">
-                <a16:creationId xmlns:a16="http://schemas.microsoft.com/office/drawing/2014/main" id="{62B7C2B2-3011-B20A-F7D1-C2C619DBD511}"/>
+          <p:cNvPr id="27" name="Rounded Rectangle 26">
+            <a:extLst>
+              <a:ext uri="{FF2B5EF4-FFF2-40B4-BE49-F238E27FC236}">
+                <a16:creationId xmlns:a16="http://schemas.microsoft.com/office/drawing/2014/main" id="{0B65DC04-2643-90F3-2806-F131EE092525}"/>
               </a:ext>
             </a:extLst>
           </p:cNvPr>
@@ -11410,17 +10748,19 @@
         </p:nvSpPr>
         <p:spPr>
           <a:xfrm>
-            <a:off x="4403790" y="4740625"/>
+            <a:off x="5615170" y="1600153"/>
             <a:ext cx="1769477" cy="1143299"/>
           </a:xfrm>
           <a:prstGeom prst="roundRect">
             <a:avLst/>
           </a:prstGeom>
           <a:solidFill>
-            <a:srgbClr val="5EBB78"/>
+            <a:srgbClr val="DCEBF5"/>
           </a:solidFill>
-          <a:ln>
-            <a:noFill/>
+          <a:ln w="19050">
+            <a:solidFill>
+              <a:srgbClr val="30335D"/>
+            </a:solidFill>
           </a:ln>
         </p:spPr>
         <p:style>
@@ -11448,334 +10788,358 @@
           </a:p>
         </p:txBody>
       </p:sp>
-      <p:sp>
-        <p:nvSpPr>
-          <p:cNvPr id="19" name="Rounded Rectangle 18">
-            <a:extLst>
-              <a:ext uri="{FF2B5EF4-FFF2-40B4-BE49-F238E27FC236}">
-                <a16:creationId xmlns:a16="http://schemas.microsoft.com/office/drawing/2014/main" id="{58EBC787-81BF-D345-36FA-085212240503}"/>
-              </a:ext>
-            </a:extLst>
-          </p:cNvPr>
-          <p:cNvSpPr/>
+      <p:grpSp>
+        <p:nvGrpSpPr>
+          <p:cNvPr id="30" name="Group 29">
+            <a:extLst>
+              <a:ext uri="{FF2B5EF4-FFF2-40B4-BE49-F238E27FC236}">
+                <a16:creationId xmlns:a16="http://schemas.microsoft.com/office/drawing/2014/main" id="{4AB763AB-EB4B-5F4E-3B8B-038574D96E67}"/>
+              </a:ext>
+            </a:extLst>
+          </p:cNvPr>
+          <p:cNvGrpSpPr/>
+          <p:nvPr/>
+        </p:nvGrpSpPr>
+        <p:grpSpPr>
+          <a:xfrm>
+            <a:off x="2646022" y="3187817"/>
+            <a:ext cx="6837019" cy="2725199"/>
+            <a:chOff x="2646022" y="3187817"/>
+            <a:chExt cx="6837019" cy="2725199"/>
+          </a:xfrm>
+          <a:solidFill>
+            <a:srgbClr val="D6EDCF"/>
+          </a:solidFill>
+        </p:grpSpPr>
+        <p:sp>
+          <p:nvSpPr>
+            <p:cNvPr id="33" name="Rounded Rectangle 32">
+              <a:extLst>
+                <a:ext uri="{FF2B5EF4-FFF2-40B4-BE49-F238E27FC236}">
+                  <a16:creationId xmlns:a16="http://schemas.microsoft.com/office/drawing/2014/main" id="{60048279-AC2C-7C94-0692-5CE2C803BF02}"/>
+                </a:ext>
+              </a:extLst>
+            </p:cNvPr>
+            <p:cNvSpPr/>
+            <p:nvPr/>
+          </p:nvSpPr>
+          <p:spPr>
+            <a:xfrm>
+              <a:off x="4613990" y="4740625"/>
+              <a:ext cx="1769477" cy="1143299"/>
+            </a:xfrm>
+            <a:prstGeom prst="roundRect">
+              <a:avLst/>
+            </a:prstGeom>
+            <a:grpFill/>
+            <a:ln w="19050">
+              <a:solidFill>
+                <a:srgbClr val="30335D"/>
+              </a:solidFill>
+            </a:ln>
+          </p:spPr>
+          <p:style>
+            <a:lnRef idx="2">
+              <a:schemeClr val="accent1">
+                <a:shade val="50000"/>
+              </a:schemeClr>
+            </a:lnRef>
+            <a:fillRef idx="1">
+              <a:schemeClr val="accent1"/>
+            </a:fillRef>
+            <a:effectRef idx="0">
+              <a:schemeClr val="accent1"/>
+            </a:effectRef>
+            <a:fontRef idx="minor">
+              <a:schemeClr val="lt1"/>
+            </a:fontRef>
+          </p:style>
+          <p:txBody>
+            <a:bodyPr rtlCol="0" anchor="ctr"/>
+            <a:lstStyle/>
+            <a:p>
+              <a:pPr algn="ctr"/>
+              <a:endParaRPr lang="en-US"/>
+            </a:p>
+          </p:txBody>
+        </p:sp>
+        <p:sp>
+          <p:nvSpPr>
+            <p:cNvPr id="34" name="Rounded Rectangle 33">
+              <a:extLst>
+                <a:ext uri="{FF2B5EF4-FFF2-40B4-BE49-F238E27FC236}">
+                  <a16:creationId xmlns:a16="http://schemas.microsoft.com/office/drawing/2014/main" id="{16F4C18A-EBBF-71DE-F9F8-3D6E91AC6159}"/>
+                </a:ext>
+              </a:extLst>
+            </p:cNvPr>
+            <p:cNvSpPr/>
+            <p:nvPr/>
+          </p:nvSpPr>
+          <p:spPr>
+            <a:xfrm>
+              <a:off x="7713564" y="3187817"/>
+              <a:ext cx="1769477" cy="1143299"/>
+            </a:xfrm>
+            <a:prstGeom prst="roundRect">
+              <a:avLst/>
+            </a:prstGeom>
+            <a:grpFill/>
+            <a:ln w="19050">
+              <a:solidFill>
+                <a:srgbClr val="30335D"/>
+              </a:solidFill>
+            </a:ln>
+          </p:spPr>
+          <p:style>
+            <a:lnRef idx="2">
+              <a:schemeClr val="accent1">
+                <a:shade val="50000"/>
+              </a:schemeClr>
+            </a:lnRef>
+            <a:fillRef idx="1">
+              <a:schemeClr val="accent1"/>
+            </a:fillRef>
+            <a:effectRef idx="0">
+              <a:schemeClr val="accent1"/>
+            </a:effectRef>
+            <a:fontRef idx="minor">
+              <a:schemeClr val="lt1"/>
+            </a:fontRef>
+          </p:style>
+          <p:txBody>
+            <a:bodyPr rtlCol="0" anchor="ctr"/>
+            <a:lstStyle/>
+            <a:p>
+              <a:pPr algn="ctr"/>
+              <a:endParaRPr lang="en-US"/>
+            </a:p>
+          </p:txBody>
+        </p:sp>
+        <p:sp>
+          <p:nvSpPr>
+            <p:cNvPr id="35" name="Rounded Rectangle 34">
+              <a:extLst>
+                <a:ext uri="{FF2B5EF4-FFF2-40B4-BE49-F238E27FC236}">
+                  <a16:creationId xmlns:a16="http://schemas.microsoft.com/office/drawing/2014/main" id="{6E8BC468-DB78-A850-CB8B-5375E89B3AF2}"/>
+                </a:ext>
+              </a:extLst>
+            </p:cNvPr>
+            <p:cNvSpPr/>
+            <p:nvPr/>
+          </p:nvSpPr>
+          <p:spPr>
+            <a:xfrm>
+              <a:off x="2646022" y="4717138"/>
+              <a:ext cx="1769477" cy="1143299"/>
+            </a:xfrm>
+            <a:prstGeom prst="roundRect">
+              <a:avLst/>
+            </a:prstGeom>
+            <a:grpFill/>
+            <a:ln w="19050">
+              <a:solidFill>
+                <a:srgbClr val="30335D"/>
+              </a:solidFill>
+            </a:ln>
+          </p:spPr>
+          <p:style>
+            <a:lnRef idx="2">
+              <a:schemeClr val="accent1">
+                <a:shade val="50000"/>
+              </a:schemeClr>
+            </a:lnRef>
+            <a:fillRef idx="1">
+              <a:schemeClr val="accent1"/>
+            </a:fillRef>
+            <a:effectRef idx="0">
+              <a:schemeClr val="accent1"/>
+            </a:effectRef>
+            <a:fontRef idx="minor">
+              <a:schemeClr val="lt1"/>
+            </a:fontRef>
+          </p:style>
+          <p:txBody>
+            <a:bodyPr rtlCol="0" anchor="ctr"/>
+            <a:lstStyle/>
+            <a:p>
+              <a:pPr algn="ctr"/>
+              <a:endParaRPr lang="en-US"/>
+            </a:p>
+          </p:txBody>
+        </p:sp>
+        <p:sp>
+          <p:nvSpPr>
+            <p:cNvPr id="36" name="Rounded Rectangle 35">
+              <a:extLst>
+                <a:ext uri="{FF2B5EF4-FFF2-40B4-BE49-F238E27FC236}">
+                  <a16:creationId xmlns:a16="http://schemas.microsoft.com/office/drawing/2014/main" id="{7301E0CE-FDC3-329E-2C28-65B5F275A05F}"/>
+                </a:ext>
+              </a:extLst>
+            </p:cNvPr>
+            <p:cNvSpPr/>
+            <p:nvPr/>
+          </p:nvSpPr>
+          <p:spPr>
+            <a:xfrm>
+              <a:off x="5615170" y="3190079"/>
+              <a:ext cx="1769477" cy="1143299"/>
+            </a:xfrm>
+            <a:prstGeom prst="roundRect">
+              <a:avLst/>
+            </a:prstGeom>
+            <a:grpFill/>
+            <a:ln w="19050">
+              <a:solidFill>
+                <a:srgbClr val="30335D"/>
+              </a:solidFill>
+            </a:ln>
+          </p:spPr>
+          <p:style>
+            <a:lnRef idx="2">
+              <a:schemeClr val="accent1">
+                <a:shade val="50000"/>
+              </a:schemeClr>
+            </a:lnRef>
+            <a:fillRef idx="1">
+              <a:schemeClr val="accent1"/>
+            </a:fillRef>
+            <a:effectRef idx="0">
+              <a:schemeClr val="accent1"/>
+            </a:effectRef>
+            <a:fontRef idx="minor">
+              <a:schemeClr val="lt1"/>
+            </a:fontRef>
+          </p:style>
+          <p:txBody>
+            <a:bodyPr rtlCol="0" anchor="ctr"/>
+            <a:lstStyle/>
+            <a:p>
+              <a:pPr algn="ctr"/>
+              <a:endParaRPr lang="en-US"/>
+            </a:p>
+          </p:txBody>
+        </p:sp>
+        <p:sp>
+          <p:nvSpPr>
+            <p:cNvPr id="37" name="Rounded Rectangle 36">
+              <a:extLst>
+                <a:ext uri="{FF2B5EF4-FFF2-40B4-BE49-F238E27FC236}">
+                  <a16:creationId xmlns:a16="http://schemas.microsoft.com/office/drawing/2014/main" id="{81A070BC-079B-50C1-70C7-B3542E1CF611}"/>
+                </a:ext>
+              </a:extLst>
+            </p:cNvPr>
+            <p:cNvSpPr/>
+            <p:nvPr/>
+          </p:nvSpPr>
+          <p:spPr>
+            <a:xfrm>
+              <a:off x="7693790" y="4769717"/>
+              <a:ext cx="1769477" cy="1143299"/>
+            </a:xfrm>
+            <a:prstGeom prst="roundRect">
+              <a:avLst/>
+            </a:prstGeom>
+            <a:grpFill/>
+            <a:ln w="19050">
+              <a:solidFill>
+                <a:srgbClr val="30335D"/>
+              </a:solidFill>
+            </a:ln>
+          </p:spPr>
+          <p:style>
+            <a:lnRef idx="2">
+              <a:schemeClr val="accent1">
+                <a:shade val="50000"/>
+              </a:schemeClr>
+            </a:lnRef>
+            <a:fillRef idx="1">
+              <a:schemeClr val="accent1"/>
+            </a:fillRef>
+            <a:effectRef idx="0">
+              <a:schemeClr val="accent1"/>
+            </a:effectRef>
+            <a:fontRef idx="minor">
+              <a:schemeClr val="lt1"/>
+            </a:fontRef>
+          </p:style>
+          <p:txBody>
+            <a:bodyPr rtlCol="0" anchor="ctr"/>
+            <a:lstStyle/>
+            <a:p>
+              <a:pPr algn="ctr"/>
+              <a:endParaRPr lang="en-US"/>
+            </a:p>
+          </p:txBody>
+        </p:sp>
+        <p:sp>
+          <p:nvSpPr>
+            <p:cNvPr id="38" name="Rounded Rectangle 37">
+              <a:extLst>
+                <a:ext uri="{FF2B5EF4-FFF2-40B4-BE49-F238E27FC236}">
+                  <a16:creationId xmlns:a16="http://schemas.microsoft.com/office/drawing/2014/main" id="{E53EEEF5-56B0-5136-B470-CCFBFFE52735}"/>
+                </a:ext>
+              </a:extLst>
+            </p:cNvPr>
+            <p:cNvSpPr/>
+            <p:nvPr/>
+          </p:nvSpPr>
+          <p:spPr>
+            <a:xfrm>
+              <a:off x="3555598" y="3201345"/>
+              <a:ext cx="1769477" cy="1143299"/>
+            </a:xfrm>
+            <a:prstGeom prst="roundRect">
+              <a:avLst/>
+            </a:prstGeom>
+            <a:grpFill/>
+            <a:ln w="19050">
+              <a:solidFill>
+                <a:srgbClr val="30335D"/>
+              </a:solidFill>
+            </a:ln>
+          </p:spPr>
+          <p:style>
+            <a:lnRef idx="2">
+              <a:schemeClr val="accent1">
+                <a:shade val="50000"/>
+              </a:schemeClr>
+            </a:lnRef>
+            <a:fillRef idx="1">
+              <a:schemeClr val="accent1"/>
+            </a:fillRef>
+            <a:effectRef idx="0">
+              <a:schemeClr val="accent1"/>
+            </a:effectRef>
+            <a:fontRef idx="minor">
+              <a:schemeClr val="lt1"/>
+            </a:fontRef>
+          </p:style>
+          <p:txBody>
+            <a:bodyPr rtlCol="0" anchor="ctr"/>
+            <a:lstStyle/>
+            <a:p>
+              <a:pPr algn="ctr"/>
+              <a:endParaRPr lang="en-US"/>
+            </a:p>
+          </p:txBody>
+        </p:sp>
+      </p:grpSp>
+      <p:sp>
+        <p:nvSpPr>
+          <p:cNvPr id="39" name="TextBox 38">
+            <a:extLst>
+              <a:ext uri="{FF2B5EF4-FFF2-40B4-BE49-F238E27FC236}">
+                <a16:creationId xmlns:a16="http://schemas.microsoft.com/office/drawing/2014/main" id="{C7379117-A2ED-9EF7-264B-1BC691A910A0}"/>
+              </a:ext>
+            </a:extLst>
+          </p:cNvPr>
+          <p:cNvSpPr txBox="1"/>
           <p:nvPr/>
         </p:nvSpPr>
         <p:spPr>
           <a:xfrm>
-            <a:off x="7503364" y="3187817"/>
-            <a:ext cx="1769477" cy="1143299"/>
-          </a:xfrm>
-          <a:prstGeom prst="roundRect">
-            <a:avLst/>
-          </a:prstGeom>
-          <a:solidFill>
-            <a:srgbClr val="5EBB78"/>
-          </a:solidFill>
-          <a:ln>
-            <a:noFill/>
-          </a:ln>
-        </p:spPr>
-        <p:style>
-          <a:lnRef idx="2">
-            <a:schemeClr val="accent1">
-              <a:shade val="50000"/>
-            </a:schemeClr>
-          </a:lnRef>
-          <a:fillRef idx="1">
-            <a:schemeClr val="accent1"/>
-          </a:fillRef>
-          <a:effectRef idx="0">
-            <a:schemeClr val="accent1"/>
-          </a:effectRef>
-          <a:fontRef idx="minor">
-            <a:schemeClr val="lt1"/>
-          </a:fontRef>
-        </p:style>
-        <p:txBody>
-          <a:bodyPr rtlCol="0" anchor="ctr"/>
-          <a:lstStyle/>
-          <a:p>
-            <a:pPr algn="ctr"/>
-            <a:endParaRPr lang="en-US"/>
-          </a:p>
-        </p:txBody>
-      </p:sp>
-      <p:sp>
-        <p:nvSpPr>
-          <p:cNvPr id="20" name="Rounded Rectangle 19">
-            <a:extLst>
-              <a:ext uri="{FF2B5EF4-FFF2-40B4-BE49-F238E27FC236}">
-                <a16:creationId xmlns:a16="http://schemas.microsoft.com/office/drawing/2014/main" id="{66A32AA7-057D-84A4-3E2A-09DE3E9C98DC}"/>
-              </a:ext>
-            </a:extLst>
-          </p:cNvPr>
-          <p:cNvSpPr/>
-          <p:nvPr/>
-        </p:nvSpPr>
-        <p:spPr>
-          <a:xfrm>
-            <a:off x="2435822" y="4717138"/>
-            <a:ext cx="1769477" cy="1143299"/>
-          </a:xfrm>
-          <a:prstGeom prst="roundRect">
-            <a:avLst/>
-          </a:prstGeom>
-          <a:solidFill>
-            <a:srgbClr val="5EBB78"/>
-          </a:solidFill>
-          <a:ln>
-            <a:noFill/>
-          </a:ln>
-        </p:spPr>
-        <p:style>
-          <a:lnRef idx="2">
-            <a:schemeClr val="accent1">
-              <a:shade val="50000"/>
-            </a:schemeClr>
-          </a:lnRef>
-          <a:fillRef idx="1">
-            <a:schemeClr val="accent1"/>
-          </a:fillRef>
-          <a:effectRef idx="0">
-            <a:schemeClr val="accent1"/>
-          </a:effectRef>
-          <a:fontRef idx="minor">
-            <a:schemeClr val="lt1"/>
-          </a:fontRef>
-        </p:style>
-        <p:txBody>
-          <a:bodyPr rtlCol="0" anchor="ctr"/>
-          <a:lstStyle/>
-          <a:p>
-            <a:pPr algn="ctr"/>
-            <a:endParaRPr lang="en-US"/>
-          </a:p>
-        </p:txBody>
-      </p:sp>
-      <p:sp>
-        <p:nvSpPr>
-          <p:cNvPr id="18" name="Rounded Rectangle 17">
-            <a:extLst>
-              <a:ext uri="{FF2B5EF4-FFF2-40B4-BE49-F238E27FC236}">
-                <a16:creationId xmlns:a16="http://schemas.microsoft.com/office/drawing/2014/main" id="{7ED6CAC5-4454-6910-57F3-0444BC470044}"/>
-              </a:ext>
-            </a:extLst>
-          </p:cNvPr>
-          <p:cNvSpPr/>
-          <p:nvPr/>
-        </p:nvSpPr>
-        <p:spPr>
-          <a:xfrm>
-            <a:off x="5404970" y="3190079"/>
-            <a:ext cx="1769477" cy="1143299"/>
-          </a:xfrm>
-          <a:prstGeom prst="roundRect">
-            <a:avLst/>
-          </a:prstGeom>
-          <a:solidFill>
-            <a:srgbClr val="5EBB78"/>
-          </a:solidFill>
-          <a:ln>
-            <a:noFill/>
-          </a:ln>
-        </p:spPr>
-        <p:style>
-          <a:lnRef idx="2">
-            <a:schemeClr val="accent1">
-              <a:shade val="50000"/>
-            </a:schemeClr>
-          </a:lnRef>
-          <a:fillRef idx="1">
-            <a:schemeClr val="accent1"/>
-          </a:fillRef>
-          <a:effectRef idx="0">
-            <a:schemeClr val="accent1"/>
-          </a:effectRef>
-          <a:fontRef idx="minor">
-            <a:schemeClr val="lt1"/>
-          </a:fontRef>
-        </p:style>
-        <p:txBody>
-          <a:bodyPr rtlCol="0" anchor="ctr"/>
-          <a:lstStyle/>
-          <a:p>
-            <a:pPr algn="ctr"/>
-            <a:endParaRPr lang="en-US"/>
-          </a:p>
-        </p:txBody>
-      </p:sp>
-      <p:sp>
-        <p:nvSpPr>
-          <p:cNvPr id="22" name="Rounded Rectangle 21">
-            <a:extLst>
-              <a:ext uri="{FF2B5EF4-FFF2-40B4-BE49-F238E27FC236}">
-                <a16:creationId xmlns:a16="http://schemas.microsoft.com/office/drawing/2014/main" id="{586446E0-9253-F4AD-9FA4-338EBF2685F7}"/>
-              </a:ext>
-            </a:extLst>
-          </p:cNvPr>
-          <p:cNvSpPr/>
-          <p:nvPr/>
-        </p:nvSpPr>
-        <p:spPr>
-          <a:xfrm>
-            <a:off x="7483590" y="4769717"/>
-            <a:ext cx="1769477" cy="1143299"/>
-          </a:xfrm>
-          <a:prstGeom prst="roundRect">
-            <a:avLst/>
-          </a:prstGeom>
-          <a:solidFill>
-            <a:srgbClr val="5EBB78"/>
-          </a:solidFill>
-          <a:ln>
-            <a:noFill/>
-          </a:ln>
-        </p:spPr>
-        <p:style>
-          <a:lnRef idx="2">
-            <a:schemeClr val="accent1">
-              <a:shade val="50000"/>
-            </a:schemeClr>
-          </a:lnRef>
-          <a:fillRef idx="1">
-            <a:schemeClr val="accent1"/>
-          </a:fillRef>
-          <a:effectRef idx="0">
-            <a:schemeClr val="accent1"/>
-          </a:effectRef>
-          <a:fontRef idx="minor">
-            <a:schemeClr val="lt1"/>
-          </a:fontRef>
-        </p:style>
-        <p:txBody>
-          <a:bodyPr rtlCol="0" anchor="ctr"/>
-          <a:lstStyle/>
-          <a:p>
-            <a:pPr algn="ctr"/>
-            <a:endParaRPr lang="en-US"/>
-          </a:p>
-        </p:txBody>
-      </p:sp>
-      <p:sp>
-        <p:nvSpPr>
-          <p:cNvPr id="9" name="Rounded Rectangle 8">
-            <a:extLst>
-              <a:ext uri="{FF2B5EF4-FFF2-40B4-BE49-F238E27FC236}">
-                <a16:creationId xmlns:a16="http://schemas.microsoft.com/office/drawing/2014/main" id="{6519754E-DD70-8E00-B973-A04DC5B9C27C}"/>
-              </a:ext>
-            </a:extLst>
-          </p:cNvPr>
-          <p:cNvSpPr/>
-          <p:nvPr/>
-        </p:nvSpPr>
-        <p:spPr>
-          <a:xfrm>
-            <a:off x="5404970" y="1600153"/>
-            <a:ext cx="1769477" cy="1143299"/>
-          </a:xfrm>
-          <a:prstGeom prst="roundRect">
-            <a:avLst/>
-          </a:prstGeom>
-          <a:solidFill>
-            <a:srgbClr val="6D6CCA"/>
-          </a:solidFill>
-          <a:ln>
-            <a:noFill/>
-          </a:ln>
-        </p:spPr>
-        <p:style>
-          <a:lnRef idx="2">
-            <a:schemeClr val="accent1">
-              <a:shade val="50000"/>
-            </a:schemeClr>
-          </a:lnRef>
-          <a:fillRef idx="1">
-            <a:schemeClr val="accent1"/>
-          </a:fillRef>
-          <a:effectRef idx="0">
-            <a:schemeClr val="accent1"/>
-          </a:effectRef>
-          <a:fontRef idx="minor">
-            <a:schemeClr val="lt1"/>
-          </a:fontRef>
-        </p:style>
-        <p:txBody>
-          <a:bodyPr rtlCol="0" anchor="ctr"/>
-          <a:lstStyle/>
-          <a:p>
-            <a:pPr algn="ctr"/>
-            <a:endParaRPr lang="en-US"/>
-          </a:p>
-        </p:txBody>
-      </p:sp>
-      <p:sp>
-        <p:nvSpPr>
-          <p:cNvPr id="17" name="Rounded Rectangle 16">
-            <a:extLst>
-              <a:ext uri="{FF2B5EF4-FFF2-40B4-BE49-F238E27FC236}">
-                <a16:creationId xmlns:a16="http://schemas.microsoft.com/office/drawing/2014/main" id="{C5207A85-ECED-7147-6C52-D17A6C56EA5E}"/>
-              </a:ext>
-            </a:extLst>
-          </p:cNvPr>
-          <p:cNvSpPr/>
-          <p:nvPr/>
-        </p:nvSpPr>
-        <p:spPr>
-          <a:xfrm>
-            <a:off x="3345398" y="3201345"/>
-            <a:ext cx="1769477" cy="1143299"/>
-          </a:xfrm>
-          <a:prstGeom prst="roundRect">
-            <a:avLst/>
-          </a:prstGeom>
-          <a:solidFill>
-            <a:srgbClr val="5EBB78"/>
-          </a:solidFill>
-          <a:ln>
-            <a:noFill/>
-          </a:ln>
-        </p:spPr>
-        <p:style>
-          <a:lnRef idx="2">
-            <a:schemeClr val="accent1">
-              <a:shade val="50000"/>
-            </a:schemeClr>
-          </a:lnRef>
-          <a:fillRef idx="1">
-            <a:schemeClr val="accent1"/>
-          </a:fillRef>
-          <a:effectRef idx="0">
-            <a:schemeClr val="accent1"/>
-          </a:effectRef>
-          <a:fontRef idx="minor">
-            <a:schemeClr val="lt1"/>
-          </a:fontRef>
-        </p:style>
-        <p:txBody>
-          <a:bodyPr rtlCol="0" anchor="ctr"/>
-          <a:lstStyle/>
-          <a:p>
-            <a:pPr algn="ctr"/>
-            <a:endParaRPr lang="en-US"/>
-          </a:p>
-        </p:txBody>
-      </p:sp>
-      <p:sp>
-        <p:nvSpPr>
-          <p:cNvPr id="10" name="TextBox 9">
-            <a:extLst>
-              <a:ext uri="{FF2B5EF4-FFF2-40B4-BE49-F238E27FC236}">
-                <a16:creationId xmlns:a16="http://schemas.microsoft.com/office/drawing/2014/main" id="{95AD22BA-31BA-913F-EDB6-29C9D53C2FFC}"/>
-              </a:ext>
-            </a:extLst>
-          </p:cNvPr>
-          <p:cNvSpPr txBox="1"/>
-          <p:nvPr/>
-        </p:nvSpPr>
-        <p:spPr>
-          <a:xfrm>
-            <a:off x="5404946" y="1987136"/>
-            <a:ext cx="1769477" cy="369332"/>
+            <a:off x="5615146" y="1987136"/>
+            <a:ext cx="1769477" cy="400110"/>
           </a:xfrm>
           <a:prstGeom prst="rect">
             <a:avLst/>
@@ -11793,11 +11157,7 @@
           <a:p>
             <a:pPr algn="ctr"/>
             <a:r>
-              <a:rPr lang="en-US" dirty="0">
-                <a:solidFill>
-                  <a:schemeClr val="bg1"/>
-                </a:solidFill>
-              </a:rPr>
+              <a:rPr lang="en-US" sz="2000" dirty="0"/>
               <a:t>Main Program</a:t>
             </a:r>
           </a:p>
@@ -11805,10 +11165,10 @@
       </p:sp>
       <p:sp>
         <p:nvSpPr>
-          <p:cNvPr id="11" name="TextBox 10">
-            <a:extLst>
-              <a:ext uri="{FF2B5EF4-FFF2-40B4-BE49-F238E27FC236}">
-                <a16:creationId xmlns:a16="http://schemas.microsoft.com/office/drawing/2014/main" id="{FCD80C5B-8872-A1A0-11C6-33FBBBC9BC9A}"/>
+          <p:cNvPr id="40" name="TextBox 39">
+            <a:extLst>
+              <a:ext uri="{FF2B5EF4-FFF2-40B4-BE49-F238E27FC236}">
+                <a16:creationId xmlns:a16="http://schemas.microsoft.com/office/drawing/2014/main" id="{02B53A79-839E-FDC8-E828-91E9295A075E}"/>
               </a:ext>
             </a:extLst>
           </p:cNvPr>
@@ -11817,8 +11177,8 @@
         </p:nvSpPr>
         <p:spPr>
           <a:xfrm>
-            <a:off x="3345388" y="3631107"/>
-            <a:ext cx="1769480" cy="369332"/>
+            <a:off x="3555587" y="3618990"/>
+            <a:ext cx="1769480" cy="400110"/>
           </a:xfrm>
           <a:prstGeom prst="rect">
             <a:avLst/>
@@ -11836,11 +11196,7 @@
           <a:p>
             <a:pPr algn="ctr"/>
             <a:r>
-              <a:rPr lang="en-US" dirty="0">
-                <a:solidFill>
-                  <a:schemeClr val="bg1"/>
-                </a:solidFill>
-              </a:rPr>
+              <a:rPr lang="en-US" sz="2000" dirty="0"/>
               <a:t>Module-M1</a:t>
             </a:r>
           </a:p>
@@ -11848,10 +11204,10 @@
       </p:sp>
       <p:sp>
         <p:nvSpPr>
-          <p:cNvPr id="12" name="TextBox 11">
-            <a:extLst>
-              <a:ext uri="{FF2B5EF4-FFF2-40B4-BE49-F238E27FC236}">
-                <a16:creationId xmlns:a16="http://schemas.microsoft.com/office/drawing/2014/main" id="{117F3664-90FC-D0C5-5A71-6524275FD806}"/>
+          <p:cNvPr id="41" name="TextBox 40">
+            <a:extLst>
+              <a:ext uri="{FF2B5EF4-FFF2-40B4-BE49-F238E27FC236}">
+                <a16:creationId xmlns:a16="http://schemas.microsoft.com/office/drawing/2014/main" id="{2AC5544C-F5B8-EC08-5213-C60144F63693}"/>
               </a:ext>
             </a:extLst>
           </p:cNvPr>
@@ -11860,8 +11216,8 @@
         </p:nvSpPr>
         <p:spPr>
           <a:xfrm>
-            <a:off x="5404969" y="3631107"/>
-            <a:ext cx="1769467" cy="369332"/>
+            <a:off x="5615168" y="3618990"/>
+            <a:ext cx="1769467" cy="400110"/>
           </a:xfrm>
           <a:prstGeom prst="rect">
             <a:avLst/>
@@ -11879,11 +11235,7 @@
           <a:p>
             <a:pPr algn="ctr"/>
             <a:r>
-              <a:rPr lang="en-US" dirty="0">
-                <a:solidFill>
-                  <a:schemeClr val="bg1"/>
-                </a:solidFill>
-              </a:rPr>
+              <a:rPr lang="en-US" sz="2000" dirty="0"/>
               <a:t>Module-M2</a:t>
             </a:r>
           </a:p>
@@ -11891,10 +11243,10 @@
       </p:sp>
       <p:sp>
         <p:nvSpPr>
-          <p:cNvPr id="13" name="TextBox 12">
-            <a:extLst>
-              <a:ext uri="{FF2B5EF4-FFF2-40B4-BE49-F238E27FC236}">
-                <a16:creationId xmlns:a16="http://schemas.microsoft.com/office/drawing/2014/main" id="{090FBFFA-B6AE-9DA9-BA97-4471720E0DCA}"/>
+          <p:cNvPr id="42" name="TextBox 41">
+            <a:extLst>
+              <a:ext uri="{FF2B5EF4-FFF2-40B4-BE49-F238E27FC236}">
+                <a16:creationId xmlns:a16="http://schemas.microsoft.com/office/drawing/2014/main" id="{1C825DA9-0650-B94C-344D-141CD369F190}"/>
               </a:ext>
             </a:extLst>
           </p:cNvPr>
@@ -11903,8 +11255,8 @@
         </p:nvSpPr>
         <p:spPr>
           <a:xfrm>
-            <a:off x="7503365" y="3631107"/>
-            <a:ext cx="1749696" cy="369332"/>
+            <a:off x="7713564" y="3618990"/>
+            <a:ext cx="1749696" cy="400110"/>
           </a:xfrm>
           <a:prstGeom prst="rect">
             <a:avLst/>
@@ -11922,11 +11274,7 @@
           <a:p>
             <a:pPr algn="ctr"/>
             <a:r>
-              <a:rPr lang="en-US" dirty="0">
-                <a:solidFill>
-                  <a:schemeClr val="bg1"/>
-                </a:solidFill>
-              </a:rPr>
+              <a:rPr lang="en-US" sz="2000" dirty="0"/>
               <a:t>Module-M3</a:t>
             </a:r>
           </a:p>
@@ -11934,10 +11282,10 @@
       </p:sp>
       <p:sp>
         <p:nvSpPr>
-          <p:cNvPr id="14" name="TextBox 13">
-            <a:extLst>
-              <a:ext uri="{FF2B5EF4-FFF2-40B4-BE49-F238E27FC236}">
-                <a16:creationId xmlns:a16="http://schemas.microsoft.com/office/drawing/2014/main" id="{E0553423-9361-E130-E015-62E48F4C887A}"/>
+          <p:cNvPr id="43" name="TextBox 42">
+            <a:extLst>
+              <a:ext uri="{FF2B5EF4-FFF2-40B4-BE49-F238E27FC236}">
+                <a16:creationId xmlns:a16="http://schemas.microsoft.com/office/drawing/2014/main" id="{7AF78C24-5923-9756-8310-C71A719A6546}"/>
               </a:ext>
             </a:extLst>
           </p:cNvPr>
@@ -11946,8 +11294,8 @@
         </p:nvSpPr>
         <p:spPr>
           <a:xfrm>
-            <a:off x="7503365" y="5153335"/>
-            <a:ext cx="1749692" cy="369332"/>
+            <a:off x="7713565" y="5153335"/>
+            <a:ext cx="1749692" cy="400110"/>
           </a:xfrm>
           <a:prstGeom prst="rect">
             <a:avLst/>
@@ -11965,11 +11313,7 @@
           <a:p>
             <a:pPr algn="ctr"/>
             <a:r>
-              <a:rPr lang="en-US" dirty="0">
-                <a:solidFill>
-                  <a:schemeClr val="bg1"/>
-                </a:solidFill>
-              </a:rPr>
+              <a:rPr lang="en-US" sz="2000" dirty="0"/>
               <a:t>Module-M6</a:t>
             </a:r>
           </a:p>
@@ -11977,10 +11321,10 @@
       </p:sp>
       <p:sp>
         <p:nvSpPr>
-          <p:cNvPr id="15" name="TextBox 14">
-            <a:extLst>
-              <a:ext uri="{FF2B5EF4-FFF2-40B4-BE49-F238E27FC236}">
-                <a16:creationId xmlns:a16="http://schemas.microsoft.com/office/drawing/2014/main" id="{6709A9C4-6C1B-A60A-8E3D-07CEC2302849}"/>
+          <p:cNvPr id="44" name="TextBox 43">
+            <a:extLst>
+              <a:ext uri="{FF2B5EF4-FFF2-40B4-BE49-F238E27FC236}">
+                <a16:creationId xmlns:a16="http://schemas.microsoft.com/office/drawing/2014/main" id="{302CED13-B9CD-B5B9-F48D-A93818EB120D}"/>
               </a:ext>
             </a:extLst>
           </p:cNvPr>
@@ -11989,8 +11333,8 @@
         </p:nvSpPr>
         <p:spPr>
           <a:xfrm>
-            <a:off x="4403780" y="5153335"/>
-            <a:ext cx="1769477" cy="369332"/>
+            <a:off x="4613980" y="5129585"/>
+            <a:ext cx="1769477" cy="400110"/>
           </a:xfrm>
           <a:prstGeom prst="rect">
             <a:avLst/>
@@ -12008,11 +11352,7 @@
           <a:p>
             <a:pPr algn="ctr"/>
             <a:r>
-              <a:rPr lang="en-US" dirty="0">
-                <a:solidFill>
-                  <a:schemeClr val="bg1"/>
-                </a:solidFill>
-              </a:rPr>
+              <a:rPr lang="en-US" sz="2000" dirty="0"/>
               <a:t>Module-M5</a:t>
             </a:r>
           </a:p>
@@ -12020,10 +11360,10 @@
       </p:sp>
       <p:sp>
         <p:nvSpPr>
-          <p:cNvPr id="16" name="TextBox 15">
-            <a:extLst>
-              <a:ext uri="{FF2B5EF4-FFF2-40B4-BE49-F238E27FC236}">
-                <a16:creationId xmlns:a16="http://schemas.microsoft.com/office/drawing/2014/main" id="{6C961B3F-BFC7-9E6F-F5F7-F6BE28A28DC8}"/>
+          <p:cNvPr id="45" name="TextBox 44">
+            <a:extLst>
+              <a:ext uri="{FF2B5EF4-FFF2-40B4-BE49-F238E27FC236}">
+                <a16:creationId xmlns:a16="http://schemas.microsoft.com/office/drawing/2014/main" id="{71348A11-4A85-8A69-C385-9EC3A6AFD153}"/>
               </a:ext>
             </a:extLst>
           </p:cNvPr>
@@ -12032,8 +11372,8 @@
         </p:nvSpPr>
         <p:spPr>
           <a:xfrm>
-            <a:off x="2435822" y="5153335"/>
-            <a:ext cx="1769477" cy="369332"/>
+            <a:off x="2646022" y="5129585"/>
+            <a:ext cx="1769477" cy="400110"/>
           </a:xfrm>
           <a:prstGeom prst="rect">
             <a:avLst/>
@@ -12051,11 +11391,7 @@
           <a:p>
             <a:pPr algn="ctr"/>
             <a:r>
-              <a:rPr lang="en-US" dirty="0">
-                <a:solidFill>
-                  <a:schemeClr val="bg1"/>
-                </a:solidFill>
-              </a:rPr>
+              <a:rPr lang="en-US" sz="2000" dirty="0"/>
               <a:t>Module-M4</a:t>
             </a:r>
           </a:p>
@@ -12063,10 +11399,10 @@
       </p:sp>
       <p:pic>
         <p:nvPicPr>
-          <p:cNvPr id="33" name="Picture 32" descr="A picture containing dark, gauge&#10;&#10;Description automatically generated">
-            <a:extLst>
-              <a:ext uri="{FF2B5EF4-FFF2-40B4-BE49-F238E27FC236}">
-                <a16:creationId xmlns:a16="http://schemas.microsoft.com/office/drawing/2014/main" id="{25813005-A22A-B68A-F9DF-62227EEB6B91}"/>
+          <p:cNvPr id="26" name="Picture 25" descr="A picture containing dark, gauge&#10;&#10;Description automatically generated">
+            <a:extLst>
+              <a:ext uri="{FF2B5EF4-FFF2-40B4-BE49-F238E27FC236}">
+                <a16:creationId xmlns:a16="http://schemas.microsoft.com/office/drawing/2014/main" id="{EB5C53BF-7E87-C5B9-B272-8C33ADC3981F}"/>
               </a:ext>
             </a:extLst>
           </p:cNvPr>
@@ -12155,7 +11491,7 @@
         </p:nvSpPr>
         <p:spPr>
           <a:xfrm>
-            <a:off x="0" y="1720197"/>
+            <a:off x="0" y="1512379"/>
             <a:ext cx="12192000" cy="3417606"/>
           </a:xfrm>
           <a:prstGeom prst="rect">
@@ -12244,7 +11580,7 @@
           <p:cNvPr id="4" name="Picture 3" descr="A picture containing dark, gauge&#10;&#10;Description automatically generated">
             <a:extLst>
               <a:ext uri="{FF2B5EF4-FFF2-40B4-BE49-F238E27FC236}">
-                <a16:creationId xmlns:a16="http://schemas.microsoft.com/office/drawing/2014/main" id="{703E33DC-65D5-767C-C998-043BEE07F6EB}"/>
+                <a16:creationId xmlns:a16="http://schemas.microsoft.com/office/drawing/2014/main" id="{0D03915A-8C1E-F637-B8F5-8AECBE10BDC2}"/>
               </a:ext>
             </a:extLst>
           </p:cNvPr>
@@ -12462,9 +11798,8 @@
             <a:r>
               <a:rPr lang="en-US" sz="3600" b="1" dirty="0">
                 <a:solidFill>
-                  <a:schemeClr val="tx1">
-                    <a:lumMod val="65000"/>
-                    <a:lumOff val="35000"/>
+                  <a:schemeClr val="bg2">
+                    <a:lumMod val="25000"/>
                   </a:schemeClr>
                 </a:solidFill>
                 <a:latin typeface="Avenir Heavy" panose="02000503020000020003" pitchFamily="2" charset="0"/>
@@ -12474,9 +11809,8 @@
             </a:r>
             <a:endParaRPr lang="en-US" sz="3600" b="1" dirty="0">
               <a:solidFill>
-                <a:schemeClr val="tx1">
-                  <a:lumMod val="65000"/>
-                  <a:lumOff val="35000"/>
+                <a:schemeClr val="bg2">
+                  <a:lumMod val="25000"/>
                 </a:schemeClr>
               </a:solidFill>
               <a:latin typeface="Avenir Heavy" panose="02000503020000020003" pitchFamily="2" charset="0"/>
@@ -12518,32 +11852,14 @@
             <a:r>
               <a:rPr lang="en-US" sz="2800" dirty="0">
                 <a:solidFill>
-                  <a:srgbClr val="5EBB78"/>
+                  <a:schemeClr val="tx1">
+                    <a:lumMod val="65000"/>
+                    <a:lumOff val="35000"/>
+                  </a:schemeClr>
                 </a:solidFill>
                 <a:latin typeface="Consolas" panose="020B0609020204030204" pitchFamily="49" charset="0"/>
               </a:rPr>
-              <a:t>def</a:t>
-            </a:r>
-            <a:r>
-              <a:rPr lang="en-US" sz="2800" dirty="0">
-                <a:latin typeface="Consolas" panose="020B0609020204030204" pitchFamily="49" charset="0"/>
-              </a:rPr>
-              <a:t> </a:t>
-            </a:r>
-            <a:r>
-              <a:rPr lang="en-US" sz="2800" dirty="0">
-                <a:solidFill>
-                  <a:srgbClr val="FFC000"/>
-                </a:solidFill>
-                <a:latin typeface="Consolas" panose="020B0609020204030204" pitchFamily="49" charset="0"/>
-              </a:rPr>
-              <a:t>&lt;name&gt;</a:t>
-            </a:r>
-            <a:r>
-              <a:rPr lang="en-US" sz="2800" dirty="0">
-                <a:latin typeface="Consolas" panose="020B0609020204030204" pitchFamily="49" charset="0"/>
-              </a:rPr>
-              <a:t>():</a:t>
+              <a:t>def &lt;name&gt;():</a:t>
             </a:r>
           </a:p>
           <a:p>
@@ -12552,18 +11868,15 @@
             </a:pPr>
             <a:r>
               <a:rPr lang="en-US" sz="2800" dirty="0">
+                <a:solidFill>
+                  <a:schemeClr val="tx1">
+                    <a:lumMod val="65000"/>
+                    <a:lumOff val="35000"/>
+                  </a:schemeClr>
+                </a:solidFill>
                 <a:latin typeface="Consolas" panose="020B0609020204030204" pitchFamily="49" charset="0"/>
               </a:rPr>
-              <a:t>	</a:t>
-            </a:r>
-            <a:r>
-              <a:rPr lang="en-US" sz="2800" dirty="0">
-                <a:solidFill>
-                  <a:srgbClr val="6D6CCA"/>
-                </a:solidFill>
-                <a:latin typeface="Consolas" panose="020B0609020204030204" pitchFamily="49" charset="0"/>
-              </a:rPr>
-              <a:t>&lt;statements&gt;</a:t>
+              <a:t>	&lt;statements&gt;</a:t>
             </a:r>
           </a:p>
           <a:p>
@@ -12573,38 +11886,14 @@
             <a:r>
               <a:rPr lang="en-US" sz="2800" dirty="0">
                 <a:solidFill>
-                  <a:srgbClr val="FFC000"/>
+                  <a:schemeClr val="tx1">
+                    <a:lumMod val="65000"/>
+                    <a:lumOff val="35000"/>
+                  </a:schemeClr>
                 </a:solidFill>
                 <a:latin typeface="Consolas" panose="020B0609020204030204" pitchFamily="49" charset="0"/>
               </a:rPr>
-              <a:t>	</a:t>
-            </a:r>
-            <a:r>
-              <a:rPr lang="en-US" sz="2800" dirty="0">
-                <a:solidFill>
-                  <a:srgbClr val="5EBB78"/>
-                </a:solidFill>
-                <a:latin typeface="Consolas" panose="020B0609020204030204" pitchFamily="49" charset="0"/>
-              </a:rPr>
-              <a:t>return</a:t>
-            </a:r>
-            <a:r>
-              <a:rPr lang="en-US" sz="2800" dirty="0">
-                <a:solidFill>
-                  <a:srgbClr val="FFC000"/>
-                </a:solidFill>
-                <a:latin typeface="Consolas" panose="020B0609020204030204" pitchFamily="49" charset="0"/>
-              </a:rPr>
-              <a:t> </a:t>
-            </a:r>
-            <a:r>
-              <a:rPr lang="en-US" sz="2800" dirty="0">
-                <a:solidFill>
-                  <a:srgbClr val="6D6CCA"/>
-                </a:solidFill>
-                <a:latin typeface="Consolas" panose="020B0609020204030204" pitchFamily="49" charset="0"/>
-              </a:rPr>
-              <a:t>&lt;values&gt;</a:t>
+              <a:t>	return &lt;values&gt;</a:t>
             </a:r>
           </a:p>
         </p:txBody>
@@ -12670,7 +11959,7 @@
           <p:cNvPr id="8" name="Picture 7" descr="A picture containing dark, gauge&#10;&#10;Description automatically generated">
             <a:extLst>
               <a:ext uri="{FF2B5EF4-FFF2-40B4-BE49-F238E27FC236}">
-                <a16:creationId xmlns:a16="http://schemas.microsoft.com/office/drawing/2014/main" id="{524B03F5-A6D7-C697-7863-F2DC9C734427}"/>
+                <a16:creationId xmlns:a16="http://schemas.microsoft.com/office/drawing/2014/main" id="{C4D04E40-614D-E29F-B261-C4F52DA81685}"/>
               </a:ext>
             </a:extLst>
           </p:cNvPr>
@@ -12775,9 +12064,8 @@
             <a:r>
               <a:rPr lang="en-US" sz="3600" b="1" dirty="0">
                 <a:solidFill>
-                  <a:schemeClr val="tx1">
-                    <a:lumMod val="65000"/>
-                    <a:lumOff val="35000"/>
+                  <a:schemeClr val="bg2">
+                    <a:lumMod val="25000"/>
                   </a:schemeClr>
                 </a:solidFill>
                 <a:latin typeface="Avenir Heavy" panose="02000503020000020003" pitchFamily="2" charset="0"/>
@@ -12787,9 +12075,8 @@
             </a:r>
             <a:endParaRPr lang="en-US" sz="3600" b="1" dirty="0">
               <a:solidFill>
-                <a:schemeClr val="tx1">
-                  <a:lumMod val="65000"/>
-                  <a:lumOff val="35000"/>
+                <a:schemeClr val="bg2">
+                  <a:lumMod val="25000"/>
                 </a:schemeClr>
               </a:solidFill>
               <a:latin typeface="Avenir Heavy" panose="02000503020000020003" pitchFamily="2" charset="0"/>
@@ -12831,7 +12118,10 @@
             <a:r>
               <a:rPr lang="en-US" sz="2800" dirty="0">
                 <a:solidFill>
-                  <a:srgbClr val="6D6CCA"/>
+                  <a:schemeClr val="tx1">
+                    <a:lumMod val="65000"/>
+                    <a:lumOff val="35000"/>
+                  </a:schemeClr>
                 </a:solidFill>
                 <a:latin typeface="Consolas" panose="020B0609020204030204" pitchFamily="49" charset="0"/>
               </a:rPr>
@@ -12840,7 +12130,10 @@
             <a:r>
               <a:rPr lang="en-US" sz="2800" dirty="0" err="1">
                 <a:solidFill>
-                  <a:srgbClr val="6D6CCA"/>
+                  <a:schemeClr val="tx1">
+                    <a:lumMod val="65000"/>
+                    <a:lumOff val="35000"/>
+                  </a:schemeClr>
                 </a:solidFill>
                 <a:latin typeface="Consolas" panose="020B0609020204030204" pitchFamily="49" charset="0"/>
               </a:rPr>
@@ -12849,17 +12142,14 @@
             <a:r>
               <a:rPr lang="en-US" sz="2800" dirty="0">
                 <a:solidFill>
-                  <a:srgbClr val="6D6CCA"/>
+                  <a:schemeClr val="tx1">
+                    <a:lumMod val="65000"/>
+                    <a:lumOff val="35000"/>
+                  </a:schemeClr>
                 </a:solidFill>
                 <a:latin typeface="Consolas" panose="020B0609020204030204" pitchFamily="49" charset="0"/>
               </a:rPr>
-              <a:t>&gt;</a:t>
-            </a:r>
-            <a:r>
-              <a:rPr lang="en-US" sz="2800" dirty="0">
-                <a:latin typeface="Consolas" panose="020B0609020204030204" pitchFamily="49" charset="0"/>
-              </a:rPr>
-              <a:t>()</a:t>
+              <a:t>&gt;()</a:t>
             </a:r>
           </a:p>
         </p:txBody>
@@ -13096,10 +12386,10 @@
       </p:sp>
       <p:pic>
         <p:nvPicPr>
-          <p:cNvPr id="11" name="Picture 10" descr="A picture containing dark, gauge&#10;&#10;Description automatically generated">
-            <a:extLst>
-              <a:ext uri="{FF2B5EF4-FFF2-40B4-BE49-F238E27FC236}">
-                <a16:creationId xmlns:a16="http://schemas.microsoft.com/office/drawing/2014/main" id="{7C3E6A26-8BF4-41D5-8047-A03792F90807}"/>
+          <p:cNvPr id="8" name="Picture 7" descr="A picture containing dark, gauge&#10;&#10;Description automatically generated">
+            <a:extLst>
+              <a:ext uri="{FF2B5EF4-FFF2-40B4-BE49-F238E27FC236}">
+                <a16:creationId xmlns:a16="http://schemas.microsoft.com/office/drawing/2014/main" id="{263179B5-46D4-0574-14B4-A46FB1D22CFA}"/>
               </a:ext>
             </a:extLst>
           </p:cNvPr>
@@ -13290,47 +12580,19 @@
             <a:r>
               <a:rPr lang="en-US" sz="3600" b="1" dirty="0">
                 <a:solidFill>
-                  <a:schemeClr val="tx1">
-                    <a:lumMod val="75000"/>
-                    <a:lumOff val="25000"/>
+                  <a:schemeClr val="bg2">
+                    <a:lumMod val="25000"/>
                   </a:schemeClr>
                 </a:solidFill>
                 <a:latin typeface="Avenir Heavy" panose="02000503020000020003" pitchFamily="2" charset="0"/>
                 <a:cs typeface="Arial" panose="020B0604020202020204" pitchFamily="34" charset="0"/>
               </a:rPr>
-              <a:t>Function </a:t>
-            </a:r>
-            <a:r>
-              <a:rPr lang="en-US" sz="3600" b="1" dirty="0">
-                <a:solidFill>
-                  <a:schemeClr val="tx1">
-                    <a:lumMod val="65000"/>
-                    <a:lumOff val="35000"/>
-                  </a:schemeClr>
-                </a:solidFill>
-                <a:latin typeface="Avenir Heavy" panose="02000503020000020003" pitchFamily="2" charset="0"/>
-                <a:cs typeface="Arial" panose="020B0604020202020204" pitchFamily="34" charset="0"/>
-              </a:rPr>
-              <a:t>Parameters</a:t>
-            </a:r>
-            <a:r>
-              <a:rPr lang="en-US" sz="3600" b="1" dirty="0">
-                <a:solidFill>
-                  <a:schemeClr val="tx1">
-                    <a:lumMod val="75000"/>
-                    <a:lumOff val="25000"/>
-                  </a:schemeClr>
-                </a:solidFill>
-                <a:latin typeface="Avenir Heavy" panose="02000503020000020003" pitchFamily="2" charset="0"/>
-                <a:cs typeface="Arial" panose="020B0604020202020204" pitchFamily="34" charset="0"/>
-              </a:rPr>
-              <a:t> and Arguments</a:t>
+              <a:t>Function Parameters and Arguments</a:t>
             </a:r>
             <a:endParaRPr lang="en-US" sz="3600" b="1" dirty="0">
               <a:solidFill>
-                <a:schemeClr val="tx1">
-                  <a:lumMod val="75000"/>
-                  <a:lumOff val="25000"/>
+                <a:schemeClr val="bg2">
+                  <a:lumMod val="25000"/>
                 </a:schemeClr>
               </a:solidFill>
               <a:latin typeface="Avenir Heavy" panose="02000503020000020003" pitchFamily="2" charset="0"/>
@@ -13372,34 +12634,14 @@
             <a:r>
               <a:rPr lang="en-US" sz="2800" dirty="0">
                 <a:solidFill>
-                  <a:srgbClr val="5EBB78"/>
+                  <a:schemeClr val="tx1">
+                    <a:lumMod val="65000"/>
+                    <a:lumOff val="35000"/>
+                  </a:schemeClr>
                 </a:solidFill>
                 <a:latin typeface="Consolas" panose="020B0609020204030204" pitchFamily="49" charset="0"/>
               </a:rPr>
-              <a:t>def</a:t>
-            </a:r>
-            <a:r>
-              <a:rPr lang="en-US" sz="2800" dirty="0">
-                <a:latin typeface="Consolas" panose="020B0609020204030204" pitchFamily="49" charset="0"/>
-              </a:rPr>
-              <a:t> &lt;function_name&gt;(</a:t>
-            </a:r>
-            <a:r>
-              <a:rPr lang="en-US" sz="2800" dirty="0">
-                <a:solidFill>
-                  <a:schemeClr val="accent2">
-                    <a:lumMod val="75000"/>
-                  </a:schemeClr>
-                </a:solidFill>
-                <a:latin typeface="Consolas" panose="020B0609020204030204" pitchFamily="49" charset="0"/>
-              </a:rPr>
-              <a:t>param1, param2, </a:t>
-            </a:r>
-            <a:r>
-              <a:rPr lang="en-US" sz="2800" dirty="0">
-                <a:latin typeface="Consolas" panose="020B0609020204030204" pitchFamily="49" charset="0"/>
-              </a:rPr>
-              <a:t>. . .)</a:t>
+              <a:t>def &lt;function_name&gt;(param1, param2, . . .)</a:t>
             </a:r>
           </a:p>
         </p:txBody>
@@ -13465,7 +12707,7 @@
           <p:cNvPr id="6" name="Picture 5" descr="A picture containing dark, gauge&#10;&#10;Description automatically generated">
             <a:extLst>
               <a:ext uri="{FF2B5EF4-FFF2-40B4-BE49-F238E27FC236}">
-                <a16:creationId xmlns:a16="http://schemas.microsoft.com/office/drawing/2014/main" id="{F8B635AE-B6D7-9D88-5224-083BE9B61634}"/>
+                <a16:creationId xmlns:a16="http://schemas.microsoft.com/office/drawing/2014/main" id="{030A29F4-F5A6-1CDE-0E71-FA5B0973736A}"/>
               </a:ext>
             </a:extLst>
           </p:cNvPr>
@@ -13488,7 +12730,7 @@
         </p:blipFill>
         <p:spPr>
           <a:xfrm>
-            <a:off x="11378037" y="6045200"/>
+            <a:off x="11378037" y="6067234"/>
             <a:ext cx="800100" cy="812800"/>
           </a:xfrm>
           <a:prstGeom prst="rect">
@@ -13558,9 +12800,8 @@
             <a:r>
               <a:rPr lang="en-US" sz="3600" b="1" dirty="0">
                 <a:solidFill>
-                  <a:schemeClr val="tx1">
-                    <a:lumMod val="65000"/>
-                    <a:lumOff val="35000"/>
+                  <a:schemeClr val="bg2">
+                    <a:lumMod val="25000"/>
                   </a:schemeClr>
                 </a:solidFill>
                 <a:latin typeface="Avenir Heavy" panose="02000503020000020003" pitchFamily="2" charset="0"/>
@@ -13570,9 +12811,8 @@
             </a:r>
             <a:endParaRPr lang="en-US" sz="3600" b="1" dirty="0">
               <a:solidFill>
-                <a:schemeClr val="tx1">
-                  <a:lumMod val="65000"/>
-                  <a:lumOff val="35000"/>
+                <a:schemeClr val="bg2">
+                  <a:lumMod val="25000"/>
                 </a:schemeClr>
               </a:solidFill>
               <a:latin typeface="Avenir Heavy" panose="02000503020000020003" pitchFamily="2" charset="0"/>
@@ -13716,7 +12956,7 @@
               <a:rPr lang="en-US" sz="2800" dirty="0">
                 <a:latin typeface="Consolas" panose="020B0609020204030204" pitchFamily="49" charset="0"/>
               </a:rPr>
-              <a:t>my_name </a:t>
+              <a:t>myName </a:t>
             </a:r>
             <a:r>
               <a:rPr lang="en-US" sz="2800" dirty="0">
@@ -13769,7 +13009,7 @@
               <a:rPr lang="en-US" sz="2800" dirty="0">
                 <a:latin typeface="Consolas" panose="020B0609020204030204" pitchFamily="49" charset="0"/>
               </a:rPr>
-              <a:t>hello(my_name)</a:t>
+              <a:t>hello(myName)</a:t>
             </a:r>
           </a:p>
         </p:txBody>
@@ -14043,7 +13283,7 @@
           <p:cNvPr id="12" name="Picture 11" descr="A picture containing dark, gauge&#10;&#10;Description automatically generated">
             <a:extLst>
               <a:ext uri="{FF2B5EF4-FFF2-40B4-BE49-F238E27FC236}">
-                <a16:creationId xmlns:a16="http://schemas.microsoft.com/office/drawing/2014/main" id="{3447D1B3-5891-6085-FAA3-BF646720BE41}"/>
+                <a16:creationId xmlns:a16="http://schemas.microsoft.com/office/drawing/2014/main" id="{95CD789F-0A1C-B16C-055A-8AEB96CEB830}"/>
               </a:ext>
             </a:extLst>
           </p:cNvPr>

</xml_diff>